<commit_message>
Removing a redundant slide
</commit_message>
<xml_diff>
--- a/doc/poster/TriBITS_Poster_Slides.pptx
+++ b/doc/poster/TriBITS_Poster_Slides.pptx
@@ -5,40 +5,39 @@
     <p:sldMasterId id="2147483648" r:id="rId1"/>
   </p:sldMasterIdLst>
   <p:notesMasterIdLst>
-    <p:notesMasterId r:id="rId25"/>
+    <p:notesMasterId r:id="rId24"/>
   </p:notesMasterIdLst>
   <p:handoutMasterIdLst>
-    <p:handoutMasterId r:id="rId26"/>
+    <p:handoutMasterId r:id="rId25"/>
   </p:handoutMasterIdLst>
   <p:sldIdLst>
     <p:sldId id="474" r:id="rId2"/>
     <p:sldId id="477" r:id="rId3"/>
     <p:sldId id="479" r:id="rId4"/>
-    <p:sldId id="475" r:id="rId5"/>
-    <p:sldId id="463" r:id="rId6"/>
-    <p:sldId id="464" r:id="rId7"/>
-    <p:sldId id="480" r:id="rId8"/>
-    <p:sldId id="465" r:id="rId9"/>
-    <p:sldId id="466" r:id="rId10"/>
-    <p:sldId id="481" r:id="rId11"/>
-    <p:sldId id="470" r:id="rId12"/>
-    <p:sldId id="445" r:id="rId13"/>
-    <p:sldId id="482" r:id="rId14"/>
-    <p:sldId id="455" r:id="rId15"/>
-    <p:sldId id="472" r:id="rId16"/>
-    <p:sldId id="457" r:id="rId17"/>
-    <p:sldId id="458" r:id="rId18"/>
-    <p:sldId id="483" r:id="rId19"/>
-    <p:sldId id="438" r:id="rId20"/>
-    <p:sldId id="473" r:id="rId21"/>
-    <p:sldId id="468" r:id="rId22"/>
-    <p:sldId id="469" r:id="rId23"/>
-    <p:sldId id="478" r:id="rId24"/>
+    <p:sldId id="463" r:id="rId5"/>
+    <p:sldId id="464" r:id="rId6"/>
+    <p:sldId id="480" r:id="rId7"/>
+    <p:sldId id="465" r:id="rId8"/>
+    <p:sldId id="466" r:id="rId9"/>
+    <p:sldId id="481" r:id="rId10"/>
+    <p:sldId id="470" r:id="rId11"/>
+    <p:sldId id="445" r:id="rId12"/>
+    <p:sldId id="482" r:id="rId13"/>
+    <p:sldId id="455" r:id="rId14"/>
+    <p:sldId id="472" r:id="rId15"/>
+    <p:sldId id="457" r:id="rId16"/>
+    <p:sldId id="458" r:id="rId17"/>
+    <p:sldId id="483" r:id="rId18"/>
+    <p:sldId id="438" r:id="rId19"/>
+    <p:sldId id="473" r:id="rId20"/>
+    <p:sldId id="468" r:id="rId21"/>
+    <p:sldId id="469" r:id="rId22"/>
+    <p:sldId id="478" r:id="rId23"/>
   </p:sldIdLst>
   <p:sldSz cx="9144000" cy="6858000" type="screen4x3"/>
   <p:notesSz cx="7315200" cy="9601200"/>
   <p:custDataLst>
-    <p:tags r:id="rId27"/>
+    <p:tags r:id="rId26"/>
   </p:custDataLst>
   <p:defaultTextStyle>
     <a:defPPr>
@@ -574,90 +573,6 @@
       </p:grpSpPr>
       <p:sp>
         <p:nvSpPr>
-          <p:cNvPr id="21506" name="Rectangle 2"/>
-          <p:cNvSpPr>
-            <a:spLocks noGrp="1" noRot="1" noChangeAspect="1" noChangeArrowheads="1" noTextEdit="1"/>
-          </p:cNvSpPr>
-          <p:nvPr>
-            <p:ph type="sldImg"/>
-          </p:nvPr>
-        </p:nvSpPr>
-        <p:spPr>
-          <a:xfrm>
-            <a:off x="1266825" y="727075"/>
-            <a:ext cx="4781550" cy="3586163"/>
-          </a:xfrm>
-          <a:ln/>
-        </p:spPr>
-      </p:sp>
-      <p:sp>
-        <p:nvSpPr>
-          <p:cNvPr id="21507" name="Rectangle 3"/>
-          <p:cNvSpPr>
-            <a:spLocks noGrp="1" noChangeArrowheads="1"/>
-          </p:cNvSpPr>
-          <p:nvPr>
-            <p:ph type="body" idx="1"/>
-          </p:nvPr>
-        </p:nvSpPr>
-        <p:spPr>
-          <a:noFill/>
-          <a:ln w="9525"/>
-          <a:extLst>
-            <a:ext uri="{909E8E84-426E-40DD-AFC4-6F175D3DCCD1}">
-              <a14:hiddenFill xmlns:a14="http://schemas.microsoft.com/office/drawing/2010/main">
-                <a:solidFill>
-                  <a:srgbClr val="FFFFFF"/>
-                </a:solidFill>
-              </a14:hiddenFill>
-            </a:ext>
-            <a:ext uri="{91240B29-F687-4F45-9708-019B960494DF}">
-              <a14:hiddenLine xmlns:a14="http://schemas.microsoft.com/office/drawing/2010/main" w="9525">
-                <a:solidFill>
-                  <a:srgbClr val="000000"/>
-                </a:solidFill>
-                <a:miter lim="800000"/>
-                <a:headEnd/>
-                <a:tailEnd/>
-              </a14:hiddenLine>
-            </a:ext>
-          </a:extLst>
-        </p:spPr>
-        <p:txBody>
-          <a:bodyPr/>
-          <a:lstStyle/>
-          <a:p>
-            <a:endParaRPr lang="en-US" altLang="en-US" dirty="0" smtClean="0"/>
-          </a:p>
-        </p:txBody>
-      </p:sp>
-    </p:spTree>
-  </p:cSld>
-  <p:clrMapOvr>
-    <a:masterClrMapping/>
-  </p:clrMapOvr>
-</p:notes>
-</file>
-
-<file path=ppt/notesSlides/notesSlide11.xml><?xml version="1.0" encoding="utf-8"?>
-<p:notes xmlns:a="http://schemas.openxmlformats.org/drawingml/2006/main" xmlns:r="http://schemas.openxmlformats.org/officeDocument/2006/relationships" xmlns:p="http://schemas.openxmlformats.org/presentationml/2006/main">
-  <p:cSld>
-    <p:spTree>
-      <p:nvGrpSpPr>
-        <p:cNvPr id="1" name=""/>
-        <p:cNvGrpSpPr/>
-        <p:nvPr/>
-      </p:nvGrpSpPr>
-      <p:grpSpPr>
-        <a:xfrm>
-          <a:off x="0" y="0"/>
-          <a:ext cx="0" cy="0"/>
-          <a:chOff x="0" y="0"/>
-          <a:chExt cx="0" cy="0"/>
-        </a:xfrm>
-      </p:grpSpPr>
-      <p:sp>
-        <p:nvSpPr>
           <p:cNvPr id="22530" name="Rectangle 2"/>
           <p:cNvSpPr>
             <a:spLocks noGrp="1" noRot="1" noChangeAspect="1" noChangeArrowheads="1" noTextEdit="1"/>
@@ -723,7 +638,7 @@
 </p:notes>
 </file>
 
-<file path=ppt/notesSlides/notesSlide12.xml><?xml version="1.0" encoding="utf-8"?>
+<file path=ppt/notesSlides/notesSlide11.xml><?xml version="1.0" encoding="utf-8"?>
 <p:notes xmlns:a="http://schemas.openxmlformats.org/drawingml/2006/main" xmlns:r="http://schemas.openxmlformats.org/officeDocument/2006/relationships" xmlns:p="http://schemas.openxmlformats.org/presentationml/2006/main">
   <p:cSld>
     <p:spTree>
@@ -807,7 +722,7 @@
 </p:notes>
 </file>
 
-<file path=ppt/notesSlides/notesSlide13.xml><?xml version="1.0" encoding="utf-8"?>
+<file path=ppt/notesSlides/notesSlide12.xml><?xml version="1.0" encoding="utf-8"?>
 <p:notes xmlns:a="http://schemas.openxmlformats.org/drawingml/2006/main" xmlns:r="http://schemas.openxmlformats.org/officeDocument/2006/relationships" xmlns:p="http://schemas.openxmlformats.org/presentationml/2006/main">
   <p:cSld>
     <p:spTree>
@@ -891,7 +806,7 @@
 </p:notes>
 </file>
 
-<file path=ppt/notesSlides/notesSlide14.xml><?xml version="1.0" encoding="utf-8"?>
+<file path=ppt/notesSlides/notesSlide13.xml><?xml version="1.0" encoding="utf-8"?>
 <p:notes xmlns:a="http://schemas.openxmlformats.org/drawingml/2006/main" xmlns:r="http://schemas.openxmlformats.org/officeDocument/2006/relationships" xmlns:p="http://schemas.openxmlformats.org/presentationml/2006/main">
   <p:cSld>
     <p:spTree>
@@ -975,7 +890,7 @@
 </p:notes>
 </file>
 
-<file path=ppt/notesSlides/notesSlide15.xml><?xml version="1.0" encoding="utf-8"?>
+<file path=ppt/notesSlides/notesSlide14.xml><?xml version="1.0" encoding="utf-8"?>
 <p:notes xmlns:a="http://schemas.openxmlformats.org/drawingml/2006/main" xmlns:r="http://schemas.openxmlformats.org/officeDocument/2006/relationships" xmlns:p="http://schemas.openxmlformats.org/presentationml/2006/main">
   <p:cSld>
     <p:spTree>
@@ -1059,7 +974,7 @@
 </p:notes>
 </file>
 
-<file path=ppt/notesSlides/notesSlide16.xml><?xml version="1.0" encoding="utf-8"?>
+<file path=ppt/notesSlides/notesSlide15.xml><?xml version="1.0" encoding="utf-8"?>
 <p:notes xmlns:a="http://schemas.openxmlformats.org/drawingml/2006/main" xmlns:r="http://schemas.openxmlformats.org/officeDocument/2006/relationships" xmlns:p="http://schemas.openxmlformats.org/presentationml/2006/main">
   <p:cSld>
     <p:spTree>
@@ -1143,7 +1058,7 @@
 </p:notes>
 </file>
 
-<file path=ppt/notesSlides/notesSlide17.xml><?xml version="1.0" encoding="utf-8"?>
+<file path=ppt/notesSlides/notesSlide16.xml><?xml version="1.0" encoding="utf-8"?>
 <p:notes xmlns:a="http://schemas.openxmlformats.org/drawingml/2006/main" xmlns:r="http://schemas.openxmlformats.org/officeDocument/2006/relationships" xmlns:p="http://schemas.openxmlformats.org/presentationml/2006/main">
   <p:cSld>
     <p:spTree>
@@ -1227,7 +1142,7 @@
 </p:notes>
 </file>
 
-<file path=ppt/notesSlides/notesSlide18.xml><?xml version="1.0" encoding="utf-8"?>
+<file path=ppt/notesSlides/notesSlide17.xml><?xml version="1.0" encoding="utf-8"?>
 <p:notes xmlns:a="http://schemas.openxmlformats.org/drawingml/2006/main" xmlns:r="http://schemas.openxmlformats.org/officeDocument/2006/relationships" xmlns:p="http://schemas.openxmlformats.org/presentationml/2006/main">
   <p:cSld>
     <p:spTree>
@@ -1311,7 +1226,7 @@
 </p:notes>
 </file>
 
-<file path=ppt/notesSlides/notesSlide19.xml><?xml version="1.0" encoding="utf-8"?>
+<file path=ppt/notesSlides/notesSlide18.xml><?xml version="1.0" encoding="utf-8"?>
 <p:notes xmlns:a="http://schemas.openxmlformats.org/drawingml/2006/main" xmlns:r="http://schemas.openxmlformats.org/officeDocument/2006/relationships" xmlns:p="http://schemas.openxmlformats.org/presentationml/2006/main">
   <p:cSld>
     <p:spTree>
@@ -1349,6 +1264,90 @@
       <p:sp>
         <p:nvSpPr>
           <p:cNvPr id="52227" name="Rectangle 3"/>
+          <p:cNvSpPr>
+            <a:spLocks noGrp="1" noChangeArrowheads="1"/>
+          </p:cNvSpPr>
+          <p:nvPr>
+            <p:ph type="body" idx="1"/>
+          </p:nvPr>
+        </p:nvSpPr>
+        <p:spPr>
+          <a:noFill/>
+          <a:ln w="9525"/>
+          <a:extLst>
+            <a:ext uri="{909E8E84-426E-40DD-AFC4-6F175D3DCCD1}">
+              <a14:hiddenFill xmlns:a14="http://schemas.microsoft.com/office/drawing/2010/main">
+                <a:solidFill>
+                  <a:srgbClr val="FFFFFF"/>
+                </a:solidFill>
+              </a14:hiddenFill>
+            </a:ext>
+            <a:ext uri="{91240B29-F687-4F45-9708-019B960494DF}">
+              <a14:hiddenLine xmlns:a14="http://schemas.microsoft.com/office/drawing/2010/main" w="9525">
+                <a:solidFill>
+                  <a:srgbClr val="000000"/>
+                </a:solidFill>
+                <a:miter lim="800000"/>
+                <a:headEnd/>
+                <a:tailEnd/>
+              </a14:hiddenLine>
+            </a:ext>
+          </a:extLst>
+        </p:spPr>
+        <p:txBody>
+          <a:bodyPr/>
+          <a:lstStyle/>
+          <a:p>
+            <a:endParaRPr lang="en-US" altLang="en-US" smtClean="0"/>
+          </a:p>
+        </p:txBody>
+      </p:sp>
+    </p:spTree>
+  </p:cSld>
+  <p:clrMapOvr>
+    <a:masterClrMapping/>
+  </p:clrMapOvr>
+</p:notes>
+</file>
+
+<file path=ppt/notesSlides/notesSlide19.xml><?xml version="1.0" encoding="utf-8"?>
+<p:notes xmlns:a="http://schemas.openxmlformats.org/drawingml/2006/main" xmlns:r="http://schemas.openxmlformats.org/officeDocument/2006/relationships" xmlns:p="http://schemas.openxmlformats.org/presentationml/2006/main">
+  <p:cSld>
+    <p:spTree>
+      <p:nvGrpSpPr>
+        <p:cNvPr id="1" name=""/>
+        <p:cNvGrpSpPr/>
+        <p:nvPr/>
+      </p:nvGrpSpPr>
+      <p:grpSpPr>
+        <a:xfrm>
+          <a:off x="0" y="0"/>
+          <a:ext cx="0" cy="0"/>
+          <a:chOff x="0" y="0"/>
+          <a:chExt cx="0" cy="0"/>
+        </a:xfrm>
+      </p:grpSpPr>
+      <p:sp>
+        <p:nvSpPr>
+          <p:cNvPr id="21506" name="Rectangle 2"/>
+          <p:cNvSpPr>
+            <a:spLocks noGrp="1" noRot="1" noChangeAspect="1" noChangeArrowheads="1" noTextEdit="1"/>
+          </p:cNvSpPr>
+          <p:nvPr>
+            <p:ph type="sldImg"/>
+          </p:nvPr>
+        </p:nvSpPr>
+        <p:spPr>
+          <a:xfrm>
+            <a:off x="1266825" y="727075"/>
+            <a:ext cx="4781550" cy="3586163"/>
+          </a:xfrm>
+          <a:ln/>
+        </p:spPr>
+      </p:sp>
+      <p:sp>
+        <p:nvSpPr>
+          <p:cNvPr id="21507" name="Rectangle 3"/>
           <p:cNvSpPr>
             <a:spLocks noGrp="1" noChangeArrowheads="1"/>
           </p:cNvSpPr>
@@ -1564,90 +1563,6 @@
 </file>
 
 <file path=ppt/notesSlides/notesSlide21.xml><?xml version="1.0" encoding="utf-8"?>
-<p:notes xmlns:a="http://schemas.openxmlformats.org/drawingml/2006/main" xmlns:r="http://schemas.openxmlformats.org/officeDocument/2006/relationships" xmlns:p="http://schemas.openxmlformats.org/presentationml/2006/main">
-  <p:cSld>
-    <p:spTree>
-      <p:nvGrpSpPr>
-        <p:cNvPr id="1" name=""/>
-        <p:cNvGrpSpPr/>
-        <p:nvPr/>
-      </p:nvGrpSpPr>
-      <p:grpSpPr>
-        <a:xfrm>
-          <a:off x="0" y="0"/>
-          <a:ext cx="0" cy="0"/>
-          <a:chOff x="0" y="0"/>
-          <a:chExt cx="0" cy="0"/>
-        </a:xfrm>
-      </p:grpSpPr>
-      <p:sp>
-        <p:nvSpPr>
-          <p:cNvPr id="21506" name="Rectangle 2"/>
-          <p:cNvSpPr>
-            <a:spLocks noGrp="1" noRot="1" noChangeAspect="1" noChangeArrowheads="1" noTextEdit="1"/>
-          </p:cNvSpPr>
-          <p:nvPr>
-            <p:ph type="sldImg"/>
-          </p:nvPr>
-        </p:nvSpPr>
-        <p:spPr>
-          <a:xfrm>
-            <a:off x="1266825" y="727075"/>
-            <a:ext cx="4781550" cy="3586163"/>
-          </a:xfrm>
-          <a:ln/>
-        </p:spPr>
-      </p:sp>
-      <p:sp>
-        <p:nvSpPr>
-          <p:cNvPr id="21507" name="Rectangle 3"/>
-          <p:cNvSpPr>
-            <a:spLocks noGrp="1" noChangeArrowheads="1"/>
-          </p:cNvSpPr>
-          <p:nvPr>
-            <p:ph type="body" idx="1"/>
-          </p:nvPr>
-        </p:nvSpPr>
-        <p:spPr>
-          <a:noFill/>
-          <a:ln w="9525"/>
-          <a:extLst>
-            <a:ext uri="{909E8E84-426E-40DD-AFC4-6F175D3DCCD1}">
-              <a14:hiddenFill xmlns:a14="http://schemas.microsoft.com/office/drawing/2010/main">
-                <a:solidFill>
-                  <a:srgbClr val="FFFFFF"/>
-                </a:solidFill>
-              </a14:hiddenFill>
-            </a:ext>
-            <a:ext uri="{91240B29-F687-4F45-9708-019B960494DF}">
-              <a14:hiddenLine xmlns:a14="http://schemas.microsoft.com/office/drawing/2010/main" w="9525">
-                <a:solidFill>
-                  <a:srgbClr val="000000"/>
-                </a:solidFill>
-                <a:miter lim="800000"/>
-                <a:headEnd/>
-                <a:tailEnd/>
-              </a14:hiddenLine>
-            </a:ext>
-          </a:extLst>
-        </p:spPr>
-        <p:txBody>
-          <a:bodyPr/>
-          <a:lstStyle/>
-          <a:p>
-            <a:endParaRPr lang="en-US" altLang="en-US" smtClean="0"/>
-          </a:p>
-        </p:txBody>
-      </p:sp>
-    </p:spTree>
-  </p:cSld>
-  <p:clrMapOvr>
-    <a:masterClrMapping/>
-  </p:clrMapOvr>
-</p:notes>
-</file>
-
-<file path=ppt/notesSlides/notesSlide22.xml><?xml version="1.0" encoding="utf-8"?>
 <p:notes xmlns:a="http://schemas.openxmlformats.org/drawingml/2006/main" xmlns:r="http://schemas.openxmlformats.org/officeDocument/2006/relationships" xmlns:p="http://schemas.openxmlformats.org/presentationml/2006/main">
   <p:cSld>
     <p:spTree>
@@ -5569,134 +5484,6 @@
       </p:grpSpPr>
       <p:sp>
         <p:nvSpPr>
-          <p:cNvPr id="9" name="TextBox 231"/>
-          <p:cNvSpPr txBox="1">
-            <a:spLocks noChangeArrowheads="1"/>
-          </p:cNvSpPr>
-          <p:nvPr/>
-        </p:nvSpPr>
-        <p:spPr bwMode="auto">
-          <a:xfrm>
-            <a:off x="107993" y="2430470"/>
-            <a:ext cx="8803772" cy="1973284"/>
-          </a:xfrm>
-          <a:prstGeom prst="rect">
-            <a:avLst/>
-          </a:prstGeom>
-          <a:noFill/>
-          <a:ln w="9525">
-            <a:noFill/>
-            <a:miter lim="800000"/>
-            <a:headEnd/>
-            <a:tailEnd/>
-          </a:ln>
-          <a:effectLst>
-            <a:outerShdw blurRad="50800" dist="38100" dir="2700000" algn="tl" rotWithShape="0">
-              <a:prstClr val="black">
-                <a:alpha val="40000"/>
-              </a:prstClr>
-            </a:outerShdw>
-          </a:effectLst>
-        </p:spPr>
-        <p:txBody>
-          <a:bodyPr wrap="square" lIns="125401" tIns="62700" rIns="125401" bIns="62700">
-            <a:spAutoFit/>
-          </a:bodyPr>
-          <a:lstStyle/>
-          <a:p>
-            <a:pPr algn="ctr"/>
-            <a:r>
-              <a:rPr lang="en-US" sz="4000" b="1" dirty="0" smtClean="0">
-                <a:solidFill>
-                  <a:schemeClr val="accent1">
-                    <a:lumMod val="75000"/>
-                  </a:schemeClr>
-                </a:solidFill>
-                <a:latin typeface="+mj-lt"/>
-              </a:rPr>
-              <a:t>TriBITS Structural Units</a:t>
-            </a:r>
-          </a:p>
-          <a:p>
-            <a:pPr algn="ctr"/>
-            <a:r>
-              <a:rPr lang="en-US" sz="4000" b="1" dirty="0" smtClean="0">
-                <a:solidFill>
-                  <a:schemeClr val="accent1">
-                    <a:lumMod val="75000"/>
-                  </a:schemeClr>
-                </a:solidFill>
-                <a:latin typeface="+mj-lt"/>
-              </a:rPr>
-              <a:t>and</a:t>
-            </a:r>
-          </a:p>
-          <a:p>
-            <a:pPr algn="ctr"/>
-            <a:r>
-              <a:rPr lang="en-US" sz="4000" b="1" dirty="0" smtClean="0">
-                <a:solidFill>
-                  <a:schemeClr val="accent1">
-                    <a:lumMod val="75000"/>
-                  </a:schemeClr>
-                </a:solidFill>
-                <a:latin typeface="+mj-lt"/>
-              </a:rPr>
-              <a:t>Meta-Projects</a:t>
-            </a:r>
-            <a:endParaRPr lang="en-US" sz="4000" b="1" dirty="0">
-              <a:solidFill>
-                <a:schemeClr val="accent1">
-                  <a:lumMod val="75000"/>
-                </a:schemeClr>
-              </a:solidFill>
-              <a:latin typeface="+mj-lt"/>
-            </a:endParaRPr>
-          </a:p>
-        </p:txBody>
-      </p:sp>
-    </p:spTree>
-    <p:extLst>
-      <p:ext uri="{BB962C8B-B14F-4D97-AF65-F5344CB8AC3E}">
-        <p14:creationId xmlns:p14="http://schemas.microsoft.com/office/powerpoint/2010/main" val="997390504"/>
-      </p:ext>
-    </p:extLst>
-  </p:cSld>
-  <p:clrMapOvr>
-    <a:masterClrMapping/>
-  </p:clrMapOvr>
-  <p:transition advTm="75766">
-    <p:dissolve/>
-  </p:transition>
-  <p:timing>
-    <p:tnLst>
-      <p:par>
-        <p:cTn id="1" dur="indefinite" restart="never" nodeType="tmRoot"/>
-      </p:par>
-    </p:tnLst>
-  </p:timing>
-</p:sld>
-</file>
-
-<file path=ppt/slides/slide11.xml><?xml version="1.0" encoding="utf-8"?>
-<p:sld xmlns:a="http://schemas.openxmlformats.org/drawingml/2006/main" xmlns:r="http://schemas.openxmlformats.org/officeDocument/2006/relationships" xmlns:p="http://schemas.openxmlformats.org/presentationml/2006/main">
-  <p:cSld>
-    <p:spTree>
-      <p:nvGrpSpPr>
-        <p:cNvPr id="1" name=""/>
-        <p:cNvGrpSpPr/>
-        <p:nvPr/>
-      </p:nvGrpSpPr>
-      <p:grpSpPr>
-        <a:xfrm>
-          <a:off x="0" y="0"/>
-          <a:ext cx="0" cy="0"/>
-          <a:chOff x="0" y="0"/>
-          <a:chExt cx="0" cy="0"/>
-        </a:xfrm>
-      </p:grpSpPr>
-      <p:sp>
-        <p:nvSpPr>
           <p:cNvPr id="3075" name="Rectangle 2"/>
           <p:cNvSpPr>
             <a:spLocks noGrp="1" noChangeArrowheads="1"/>
@@ -6556,7 +6343,7 @@
 </p:sld>
 </file>
 
-<file path=ppt/slides/slide12.xml><?xml version="1.0" encoding="utf-8"?>
+<file path=ppt/slides/slide11.xml><?xml version="1.0" encoding="utf-8"?>
 <p:sld xmlns:a="http://schemas.openxmlformats.org/drawingml/2006/main" xmlns:r="http://schemas.openxmlformats.org/officeDocument/2006/relationships" xmlns:p="http://schemas.openxmlformats.org/presentationml/2006/main">
   <p:cSld>
     <p:spTree>
@@ -11014,7 +10801,7 @@
 </p:sld>
 </file>
 
-<file path=ppt/slides/slide13.xml><?xml version="1.0" encoding="utf-8"?>
+<file path=ppt/slides/slide12.xml><?xml version="1.0" encoding="utf-8"?>
 <p:sld xmlns:a="http://schemas.openxmlformats.org/drawingml/2006/main" xmlns:r="http://schemas.openxmlformats.org/officeDocument/2006/relationships" xmlns:p="http://schemas.openxmlformats.org/presentationml/2006/main">
   <p:cSld>
     <p:spTree>
@@ -11106,7 +10893,7 @@
 </p:sld>
 </file>
 
-<file path=ppt/slides/slide14.xml><?xml version="1.0" encoding="utf-8"?>
+<file path=ppt/slides/slide13.xml><?xml version="1.0" encoding="utf-8"?>
 <p:sld xmlns:a="http://schemas.openxmlformats.org/drawingml/2006/main" xmlns:r="http://schemas.openxmlformats.org/officeDocument/2006/relationships" xmlns:p="http://schemas.openxmlformats.org/presentationml/2006/main">
   <p:cSld>
     <p:spTree>
@@ -14125,7 +13912,7 @@
 </p:sld>
 </file>
 
-<file path=ppt/slides/slide15.xml><?xml version="1.0" encoding="utf-8"?>
+<file path=ppt/slides/slide14.xml><?xml version="1.0" encoding="utf-8"?>
 <p:sld xmlns:a="http://schemas.openxmlformats.org/drawingml/2006/main" xmlns:r="http://schemas.openxmlformats.org/officeDocument/2006/relationships" xmlns:p="http://schemas.openxmlformats.org/presentationml/2006/main">
   <p:cSld>
     <p:spTree>
@@ -16303,7 +16090,7 @@
 </p:sld>
 </file>
 
-<file path=ppt/slides/slide16.xml><?xml version="1.0" encoding="utf-8"?>
+<file path=ppt/slides/slide15.xml><?xml version="1.0" encoding="utf-8"?>
 <p:sld xmlns:a="http://schemas.openxmlformats.org/drawingml/2006/main" xmlns:r="http://schemas.openxmlformats.org/officeDocument/2006/relationships" xmlns:p="http://schemas.openxmlformats.org/presentationml/2006/main">
   <p:cSld>
     <p:spTree>
@@ -19191,7 +18978,7 @@
 </p:sld>
 </file>
 
-<file path=ppt/slides/slide17.xml><?xml version="1.0" encoding="utf-8"?>
+<file path=ppt/slides/slide16.xml><?xml version="1.0" encoding="utf-8"?>
 <p:sld xmlns:a="http://schemas.openxmlformats.org/drawingml/2006/main" xmlns:r="http://schemas.openxmlformats.org/officeDocument/2006/relationships" xmlns:p="http://schemas.openxmlformats.org/presentationml/2006/main">
   <p:cSld>
     <p:spTree>
@@ -22701,7 +22488,7 @@
 </p:sld>
 </file>
 
-<file path=ppt/slides/slide18.xml><?xml version="1.0" encoding="utf-8"?>
+<file path=ppt/slides/slide17.xml><?xml version="1.0" encoding="utf-8"?>
 <p:sld xmlns:a="http://schemas.openxmlformats.org/drawingml/2006/main" xmlns:r="http://schemas.openxmlformats.org/officeDocument/2006/relationships" xmlns:p="http://schemas.openxmlformats.org/presentationml/2006/main">
   <p:cSld>
     <p:spTree>
@@ -22793,7 +22580,7 @@
 </p:sld>
 </file>
 
-<file path=ppt/slides/slide19.xml><?xml version="1.0" encoding="utf-8"?>
+<file path=ppt/slides/slide18.xml><?xml version="1.0" encoding="utf-8"?>
 <p:sld xmlns:a="http://schemas.openxmlformats.org/drawingml/2006/main" xmlns:r="http://schemas.openxmlformats.org/officeDocument/2006/relationships" xmlns:p="http://schemas.openxmlformats.org/presentationml/2006/main">
   <p:cSld>
     <p:spTree>
@@ -25177,6 +24964,468 @@
 </p:sld>
 </file>
 
+<file path=ppt/slides/slide19.xml><?xml version="1.0" encoding="utf-8"?>
+<p:sld xmlns:a="http://schemas.openxmlformats.org/drawingml/2006/main" xmlns:r="http://schemas.openxmlformats.org/officeDocument/2006/relationships" xmlns:p="http://schemas.openxmlformats.org/presentationml/2006/main">
+  <p:cSld>
+    <p:spTree>
+      <p:nvGrpSpPr>
+        <p:cNvPr id="1" name=""/>
+        <p:cNvGrpSpPr/>
+        <p:nvPr/>
+      </p:nvGrpSpPr>
+      <p:grpSpPr>
+        <a:xfrm>
+          <a:off x="0" y="0"/>
+          <a:ext cx="0" cy="0"/>
+          <a:chOff x="0" y="0"/>
+          <a:chExt cx="0" cy="0"/>
+        </a:xfrm>
+      </p:grpSpPr>
+      <p:sp>
+        <p:nvSpPr>
+          <p:cNvPr id="14338" name="Rectangle 2"/>
+          <p:cNvSpPr>
+            <a:spLocks noGrp="1" noChangeArrowheads="1"/>
+          </p:cNvSpPr>
+          <p:nvPr>
+            <p:ph type="title"/>
+          </p:nvPr>
+        </p:nvSpPr>
+        <p:spPr/>
+        <p:txBody>
+          <a:bodyPr/>
+          <a:lstStyle/>
+          <a:p>
+            <a:r>
+              <a:rPr lang="en-US" altLang="en-US" dirty="0" smtClean="0"/>
+              <a:t>Pre-Push CI Testing: checkin-test.py</a:t>
+            </a:r>
+          </a:p>
+        </p:txBody>
+      </p:sp>
+      <p:sp>
+        <p:nvSpPr>
+          <p:cNvPr id="14339" name="Rectangle 3"/>
+          <p:cNvSpPr>
+            <a:spLocks noChangeArrowheads="1"/>
+          </p:cNvSpPr>
+          <p:nvPr/>
+        </p:nvSpPr>
+        <p:spPr bwMode="auto">
+          <a:xfrm>
+            <a:off x="424260" y="702245"/>
+            <a:ext cx="8488207" cy="5555880"/>
+          </a:xfrm>
+          <a:prstGeom prst="rect">
+            <a:avLst/>
+          </a:prstGeom>
+          <a:noFill/>
+          <a:ln>
+            <a:noFill/>
+          </a:ln>
+          <a:extLst>
+            <a:ext uri="{909E8E84-426E-40DD-AFC4-6F175D3DCCD1}">
+              <a14:hiddenFill xmlns:a14="http://schemas.microsoft.com/office/drawing/2010/main">
+                <a:solidFill>
+                  <a:srgbClr val="FFFFFF"/>
+                </a:solidFill>
+              </a14:hiddenFill>
+            </a:ext>
+            <a:ext uri="{91240B29-F687-4F45-9708-019B960494DF}">
+              <a14:hiddenLine xmlns:a14="http://schemas.microsoft.com/office/drawing/2010/main" w="12700">
+                <a:solidFill>
+                  <a:srgbClr val="000000"/>
+                </a:solidFill>
+                <a:miter lim="800000"/>
+                <a:headEnd/>
+                <a:tailEnd/>
+              </a14:hiddenLine>
+            </a:ext>
+          </a:extLst>
+        </p:spPr>
+        <p:txBody>
+          <a:bodyPr wrap="square" lIns="90487" tIns="44450" rIns="90487" bIns="44450">
+            <a:spAutoFit/>
+          </a:bodyPr>
+          <a:lstStyle>
+            <a:lvl1pPr marL="342900" indent="-171450">
+              <a:defRPr>
+                <a:solidFill>
+                  <a:schemeClr val="tx1"/>
+                </a:solidFill>
+                <a:latin typeface="Arial" charset="0"/>
+              </a:defRPr>
+            </a:lvl1pPr>
+            <a:lvl2pPr marL="800100" indent="-171450">
+              <a:defRPr>
+                <a:solidFill>
+                  <a:schemeClr val="tx1"/>
+                </a:solidFill>
+                <a:latin typeface="Arial" charset="0"/>
+              </a:defRPr>
+            </a:lvl2pPr>
+            <a:lvl3pPr marL="1257300" indent="-171450">
+              <a:defRPr>
+                <a:solidFill>
+                  <a:schemeClr val="tx1"/>
+                </a:solidFill>
+                <a:latin typeface="Arial" charset="0"/>
+              </a:defRPr>
+            </a:lvl3pPr>
+            <a:lvl4pPr marL="1600200" indent="-228600">
+              <a:defRPr>
+                <a:solidFill>
+                  <a:schemeClr val="tx1"/>
+                </a:solidFill>
+                <a:latin typeface="Arial" charset="0"/>
+              </a:defRPr>
+            </a:lvl4pPr>
+            <a:lvl5pPr marL="2057400" indent="-228600">
+              <a:defRPr>
+                <a:solidFill>
+                  <a:schemeClr val="tx1"/>
+                </a:solidFill>
+                <a:latin typeface="Arial" charset="0"/>
+              </a:defRPr>
+            </a:lvl5pPr>
+            <a:lvl6pPr marL="2514600" indent="-228600" eaLnBrk="0" fontAlgn="base" hangingPunct="0">
+              <a:spcBef>
+                <a:spcPct val="0"/>
+              </a:spcBef>
+              <a:spcAft>
+                <a:spcPct val="0"/>
+              </a:spcAft>
+              <a:defRPr>
+                <a:solidFill>
+                  <a:schemeClr val="tx1"/>
+                </a:solidFill>
+                <a:latin typeface="Arial" charset="0"/>
+              </a:defRPr>
+            </a:lvl6pPr>
+            <a:lvl7pPr marL="2971800" indent="-228600" eaLnBrk="0" fontAlgn="base" hangingPunct="0">
+              <a:spcBef>
+                <a:spcPct val="0"/>
+              </a:spcBef>
+              <a:spcAft>
+                <a:spcPct val="0"/>
+              </a:spcAft>
+              <a:defRPr>
+                <a:solidFill>
+                  <a:schemeClr val="tx1"/>
+                </a:solidFill>
+                <a:latin typeface="Arial" charset="0"/>
+              </a:defRPr>
+            </a:lvl7pPr>
+            <a:lvl8pPr marL="3429000" indent="-228600" eaLnBrk="0" fontAlgn="base" hangingPunct="0">
+              <a:spcBef>
+                <a:spcPct val="0"/>
+              </a:spcBef>
+              <a:spcAft>
+                <a:spcPct val="0"/>
+              </a:spcAft>
+              <a:defRPr>
+                <a:solidFill>
+                  <a:schemeClr val="tx1"/>
+                </a:solidFill>
+                <a:latin typeface="Arial" charset="0"/>
+              </a:defRPr>
+            </a:lvl8pPr>
+            <a:lvl9pPr marL="3886200" indent="-228600" eaLnBrk="0" fontAlgn="base" hangingPunct="0">
+              <a:spcBef>
+                <a:spcPct val="0"/>
+              </a:spcBef>
+              <a:spcAft>
+                <a:spcPct val="0"/>
+              </a:spcAft>
+              <a:defRPr>
+                <a:solidFill>
+                  <a:schemeClr val="tx1"/>
+                </a:solidFill>
+                <a:latin typeface="Arial" charset="0"/>
+              </a:defRPr>
+            </a:lvl9pPr>
+          </a:lstStyle>
+          <a:p>
+            <a:pPr>
+              <a:spcAft>
+                <a:spcPct val="20000"/>
+              </a:spcAft>
+              <a:buSzPct val="100000"/>
+            </a:pPr>
+            <a:r>
+              <a:rPr lang="en-US" altLang="en-US" sz="2400" dirty="0" smtClean="0">
+                <a:solidFill>
+                  <a:srgbClr val="D30AA5"/>
+                </a:solidFill>
+              </a:rPr>
+              <a:t>      </a:t>
+            </a:r>
+            <a:r>
+              <a:rPr lang="en-US" altLang="en-US" sz="4800" dirty="0" smtClean="0">
+                <a:solidFill>
+                  <a:srgbClr val="D30AA5"/>
+                </a:solidFill>
+                <a:latin typeface="Cordia New" panose="020B0304020202020204" pitchFamily="34" charset="-34"/>
+                <a:cs typeface="Cordia New" panose="020B0304020202020204" pitchFamily="34" charset="-34"/>
+              </a:rPr>
+              <a:t>checkin-test.py --do-all --push</a:t>
+            </a:r>
+            <a:endParaRPr lang="en-US" altLang="en-US" sz="2400" dirty="0">
+              <a:solidFill>
+                <a:srgbClr val="D30AA5"/>
+              </a:solidFill>
+            </a:endParaRPr>
+          </a:p>
+          <a:p>
+            <a:pPr>
+              <a:spcAft>
+                <a:spcPct val="20000"/>
+              </a:spcAft>
+              <a:buSzPct val="100000"/>
+              <a:buFont typeface="Arial" charset="0"/>
+              <a:buChar char="•"/>
+            </a:pPr>
+            <a:r>
+              <a:rPr lang="en-US" altLang="en-US" sz="2400" dirty="0" smtClean="0"/>
+              <a:t>Integrates with latest version in remote </a:t>
+            </a:r>
+            <a:r>
+              <a:rPr lang="en-US" altLang="en-US" sz="2400" dirty="0" err="1" smtClean="0"/>
+              <a:t>git</a:t>
+            </a:r>
+            <a:r>
+              <a:rPr lang="en-US" altLang="en-US" sz="2400" dirty="0" smtClean="0"/>
+              <a:t> repositories</a:t>
+            </a:r>
+          </a:p>
+          <a:p>
+            <a:pPr>
+              <a:spcAft>
+                <a:spcPct val="20000"/>
+              </a:spcAft>
+              <a:buSzPct val="100000"/>
+              <a:buFont typeface="Arial" charset="0"/>
+              <a:buChar char="•"/>
+            </a:pPr>
+            <a:r>
+              <a:rPr lang="en-US" altLang="en-US" sz="2400" dirty="0" smtClean="0"/>
+              <a:t>Figures </a:t>
+            </a:r>
+            <a:r>
+              <a:rPr lang="en-US" altLang="en-US" sz="2400" dirty="0"/>
+              <a:t>out </a:t>
+            </a:r>
+            <a:r>
+              <a:rPr lang="en-US" altLang="en-US" sz="2400" dirty="0" smtClean="0"/>
+              <a:t>modified packages</a:t>
+            </a:r>
+          </a:p>
+          <a:p>
+            <a:pPr marL="457200" lvl="2" indent="0">
+              <a:spcAft>
+                <a:spcPts val="0"/>
+              </a:spcAft>
+              <a:buSzPct val="100000"/>
+            </a:pPr>
+            <a:r>
+              <a:rPr lang="en-US" altLang="en-US" sz="3600" dirty="0" smtClean="0">
+                <a:solidFill>
+                  <a:srgbClr val="008657"/>
+                </a:solidFill>
+                <a:latin typeface="Cordia New" panose="020B0304020202020204" pitchFamily="34" charset="-34"/>
+                <a:cs typeface="Cordia New" panose="020B0304020202020204" pitchFamily="34" charset="-34"/>
+              </a:rPr>
+              <a:t>Modified </a:t>
+            </a:r>
+            <a:r>
+              <a:rPr lang="en-US" altLang="en-US" sz="3600" dirty="0">
+                <a:solidFill>
+                  <a:srgbClr val="008657"/>
+                </a:solidFill>
+                <a:latin typeface="Cordia New" panose="020B0304020202020204" pitchFamily="34" charset="-34"/>
+                <a:cs typeface="Cordia New" panose="020B0304020202020204" pitchFamily="34" charset="-34"/>
+              </a:rPr>
+              <a:t>file: 'packages/</a:t>
+            </a:r>
+            <a:r>
+              <a:rPr lang="en-US" altLang="en-US" sz="3600" dirty="0" err="1">
+                <a:solidFill>
+                  <a:srgbClr val="008657"/>
+                </a:solidFill>
+                <a:latin typeface="Cordia New" panose="020B0304020202020204" pitchFamily="34" charset="-34"/>
+                <a:cs typeface="Cordia New" panose="020B0304020202020204" pitchFamily="34" charset="-34"/>
+              </a:rPr>
+              <a:t>teuchos</a:t>
+            </a:r>
+            <a:r>
+              <a:rPr lang="en-US" altLang="en-US" sz="3600" dirty="0">
+                <a:solidFill>
+                  <a:srgbClr val="008657"/>
+                </a:solidFill>
+                <a:latin typeface="Cordia New" panose="020B0304020202020204" pitchFamily="34" charset="-34"/>
+                <a:cs typeface="Cordia New" panose="020B0304020202020204" pitchFamily="34" charset="-34"/>
+              </a:rPr>
+              <a:t>/CMakeLists.txt'</a:t>
+            </a:r>
+          </a:p>
+          <a:p>
+            <a:pPr marL="457200" lvl="2" indent="0">
+              <a:spcAft>
+                <a:spcPts val="0"/>
+              </a:spcAft>
+              <a:buSzPct val="100000"/>
+            </a:pPr>
+            <a:r>
+              <a:rPr lang="en-US" altLang="en-US" sz="3600" dirty="0">
+                <a:solidFill>
+                  <a:srgbClr val="008657"/>
+                </a:solidFill>
+                <a:latin typeface="Cordia New" panose="020B0304020202020204" pitchFamily="34" charset="-34"/>
+                <a:cs typeface="Cordia New" panose="020B0304020202020204" pitchFamily="34" charset="-34"/>
+              </a:rPr>
+              <a:t>  =&gt; Enabling 'Teuchos'!</a:t>
+            </a:r>
+          </a:p>
+          <a:p>
+            <a:pPr>
+              <a:spcAft>
+                <a:spcPct val="20000"/>
+              </a:spcAft>
+              <a:buSzPct val="100000"/>
+              <a:buFont typeface="Arial" charset="0"/>
+              <a:buChar char="•"/>
+            </a:pPr>
+            <a:r>
+              <a:rPr lang="en-US" altLang="en-US" sz="2400" dirty="0" smtClean="0"/>
+              <a:t>Enables </a:t>
+            </a:r>
+            <a:r>
+              <a:rPr lang="en-US" altLang="en-US" sz="2400" dirty="0"/>
+              <a:t>all </a:t>
+            </a:r>
+            <a:r>
+              <a:rPr lang="en-US" altLang="en-US" sz="2400" dirty="0" smtClean="0"/>
+              <a:t>forward/downstream packages &amp; tests</a:t>
+            </a:r>
+            <a:endParaRPr lang="en-US" altLang="en-US" sz="2400" dirty="0"/>
+          </a:p>
+          <a:p>
+            <a:pPr>
+              <a:spcAft>
+                <a:spcPct val="20000"/>
+              </a:spcAft>
+              <a:buSzPct val="100000"/>
+              <a:buFont typeface="Arial" charset="0"/>
+              <a:buChar char="•"/>
+            </a:pPr>
+            <a:r>
+              <a:rPr lang="en-US" altLang="en-US" sz="2400" dirty="0"/>
+              <a:t>Configures, </a:t>
+            </a:r>
+            <a:r>
+              <a:rPr lang="en-US" altLang="en-US" sz="2400" dirty="0" smtClean="0"/>
+              <a:t>builds, and runs tests</a:t>
+            </a:r>
+          </a:p>
+          <a:p>
+            <a:pPr>
+              <a:spcAft>
+                <a:spcPct val="20000"/>
+              </a:spcAft>
+              <a:buSzPct val="100000"/>
+              <a:buFont typeface="Arial" charset="0"/>
+              <a:buChar char="•"/>
+            </a:pPr>
+            <a:r>
+              <a:rPr lang="en-US" altLang="en-US" sz="2400" dirty="0" smtClean="0"/>
+              <a:t>Does the push (if all builds/tests pass)</a:t>
+            </a:r>
+            <a:endParaRPr lang="en-US" altLang="en-US" sz="2400" dirty="0"/>
+          </a:p>
+          <a:p>
+            <a:pPr>
+              <a:spcAft>
+                <a:spcPct val="20000"/>
+              </a:spcAft>
+              <a:buSzPct val="100000"/>
+              <a:buFont typeface="Arial" charset="0"/>
+              <a:buChar char="•"/>
+            </a:pPr>
+            <a:r>
+              <a:rPr lang="en-US" altLang="en-US" sz="2400" dirty="0"/>
+              <a:t>Sends </a:t>
+            </a:r>
+            <a:r>
+              <a:rPr lang="en-US" altLang="en-US" sz="2400" dirty="0" smtClean="0"/>
+              <a:t>notification emails</a:t>
+            </a:r>
+            <a:endParaRPr lang="en-US" altLang="en-US" sz="2400" dirty="0"/>
+          </a:p>
+          <a:p>
+            <a:pPr>
+              <a:spcAft>
+                <a:spcPct val="20000"/>
+              </a:spcAft>
+              <a:buSzPct val="100000"/>
+              <a:buFont typeface="Arial" charset="0"/>
+              <a:buChar char="•"/>
+            </a:pPr>
+            <a:r>
+              <a:rPr lang="en-US" altLang="en-US" sz="2400" dirty="0" smtClean="0"/>
+              <a:t>Fully </a:t>
+            </a:r>
+            <a:r>
+              <a:rPr lang="en-US" altLang="en-US" sz="2400" dirty="0"/>
+              <a:t>customizable (enabled packages, build cases, etc.)</a:t>
+            </a:r>
+          </a:p>
+          <a:p>
+            <a:pPr>
+              <a:spcAft>
+                <a:spcPct val="20000"/>
+              </a:spcAft>
+              <a:buSzPct val="100000"/>
+              <a:buFont typeface="Arial" charset="0"/>
+              <a:buChar char="•"/>
+            </a:pPr>
+            <a:r>
+              <a:rPr lang="en-US" altLang="en-US" sz="2400" dirty="0"/>
+              <a:t>Documentation: </a:t>
+            </a:r>
+            <a:r>
+              <a:rPr lang="en-US" altLang="en-US" sz="2400" dirty="0">
+                <a:solidFill>
+                  <a:srgbClr val="D30AA5"/>
+                </a:solidFill>
+              </a:rPr>
+              <a:t>checkin-test.py --help</a:t>
+            </a:r>
+          </a:p>
+        </p:txBody>
+      </p:sp>
+    </p:spTree>
+    <p:extLst>
+      <p:ext uri="{BB962C8B-B14F-4D97-AF65-F5344CB8AC3E}">
+        <p14:creationId xmlns:p14="http://schemas.microsoft.com/office/powerpoint/2010/main" val="3198129426"/>
+      </p:ext>
+    </p:extLst>
+  </p:cSld>
+  <p:clrMapOvr>
+    <a:masterClrMapping/>
+  </p:clrMapOvr>
+  <p:transition advTm="75766">
+    <p:dissolve/>
+  </p:transition>
+  <p:timing>
+    <p:tnLst>
+      <p:par>
+        <p:cTn id="1" dur="indefinite" restart="never" nodeType="tmRoot"/>
+      </p:par>
+    </p:tnLst>
+  </p:timing>
+</p:sld>
+</file>
+
 <file path=ppt/slides/slide2.xml><?xml version="1.0" encoding="utf-8"?>
 <p:sld xmlns:a="http://schemas.openxmlformats.org/drawingml/2006/main" xmlns:r="http://schemas.openxmlformats.org/officeDocument/2006/relationships" xmlns:p="http://schemas.openxmlformats.org/presentationml/2006/main">
   <p:cSld>
@@ -25636,468 +25885,6 @@
 </file>
 
 <file path=ppt/slides/slide20.xml><?xml version="1.0" encoding="utf-8"?>
-<p:sld xmlns:a="http://schemas.openxmlformats.org/drawingml/2006/main" xmlns:r="http://schemas.openxmlformats.org/officeDocument/2006/relationships" xmlns:p="http://schemas.openxmlformats.org/presentationml/2006/main">
-  <p:cSld>
-    <p:spTree>
-      <p:nvGrpSpPr>
-        <p:cNvPr id="1" name=""/>
-        <p:cNvGrpSpPr/>
-        <p:nvPr/>
-      </p:nvGrpSpPr>
-      <p:grpSpPr>
-        <a:xfrm>
-          <a:off x="0" y="0"/>
-          <a:ext cx="0" cy="0"/>
-          <a:chOff x="0" y="0"/>
-          <a:chExt cx="0" cy="0"/>
-        </a:xfrm>
-      </p:grpSpPr>
-      <p:sp>
-        <p:nvSpPr>
-          <p:cNvPr id="14338" name="Rectangle 2"/>
-          <p:cNvSpPr>
-            <a:spLocks noGrp="1" noChangeArrowheads="1"/>
-          </p:cNvSpPr>
-          <p:nvPr>
-            <p:ph type="title"/>
-          </p:nvPr>
-        </p:nvSpPr>
-        <p:spPr/>
-        <p:txBody>
-          <a:bodyPr/>
-          <a:lstStyle/>
-          <a:p>
-            <a:r>
-              <a:rPr lang="en-US" altLang="en-US" dirty="0" smtClean="0"/>
-              <a:t>Pre-Push CI Testing: checkin-test.py</a:t>
-            </a:r>
-          </a:p>
-        </p:txBody>
-      </p:sp>
-      <p:sp>
-        <p:nvSpPr>
-          <p:cNvPr id="14339" name="Rectangle 3"/>
-          <p:cNvSpPr>
-            <a:spLocks noChangeArrowheads="1"/>
-          </p:cNvSpPr>
-          <p:nvPr/>
-        </p:nvSpPr>
-        <p:spPr bwMode="auto">
-          <a:xfrm>
-            <a:off x="424260" y="702245"/>
-            <a:ext cx="8488207" cy="5555880"/>
-          </a:xfrm>
-          <a:prstGeom prst="rect">
-            <a:avLst/>
-          </a:prstGeom>
-          <a:noFill/>
-          <a:ln>
-            <a:noFill/>
-          </a:ln>
-          <a:extLst>
-            <a:ext uri="{909E8E84-426E-40DD-AFC4-6F175D3DCCD1}">
-              <a14:hiddenFill xmlns:a14="http://schemas.microsoft.com/office/drawing/2010/main">
-                <a:solidFill>
-                  <a:srgbClr val="FFFFFF"/>
-                </a:solidFill>
-              </a14:hiddenFill>
-            </a:ext>
-            <a:ext uri="{91240B29-F687-4F45-9708-019B960494DF}">
-              <a14:hiddenLine xmlns:a14="http://schemas.microsoft.com/office/drawing/2010/main" w="12700">
-                <a:solidFill>
-                  <a:srgbClr val="000000"/>
-                </a:solidFill>
-                <a:miter lim="800000"/>
-                <a:headEnd/>
-                <a:tailEnd/>
-              </a14:hiddenLine>
-            </a:ext>
-          </a:extLst>
-        </p:spPr>
-        <p:txBody>
-          <a:bodyPr wrap="square" lIns="90487" tIns="44450" rIns="90487" bIns="44450">
-            <a:spAutoFit/>
-          </a:bodyPr>
-          <a:lstStyle>
-            <a:lvl1pPr marL="342900" indent="-171450">
-              <a:defRPr>
-                <a:solidFill>
-                  <a:schemeClr val="tx1"/>
-                </a:solidFill>
-                <a:latin typeface="Arial" charset="0"/>
-              </a:defRPr>
-            </a:lvl1pPr>
-            <a:lvl2pPr marL="800100" indent="-171450">
-              <a:defRPr>
-                <a:solidFill>
-                  <a:schemeClr val="tx1"/>
-                </a:solidFill>
-                <a:latin typeface="Arial" charset="0"/>
-              </a:defRPr>
-            </a:lvl2pPr>
-            <a:lvl3pPr marL="1257300" indent="-171450">
-              <a:defRPr>
-                <a:solidFill>
-                  <a:schemeClr val="tx1"/>
-                </a:solidFill>
-                <a:latin typeface="Arial" charset="0"/>
-              </a:defRPr>
-            </a:lvl3pPr>
-            <a:lvl4pPr marL="1600200" indent="-228600">
-              <a:defRPr>
-                <a:solidFill>
-                  <a:schemeClr val="tx1"/>
-                </a:solidFill>
-                <a:latin typeface="Arial" charset="0"/>
-              </a:defRPr>
-            </a:lvl4pPr>
-            <a:lvl5pPr marL="2057400" indent="-228600">
-              <a:defRPr>
-                <a:solidFill>
-                  <a:schemeClr val="tx1"/>
-                </a:solidFill>
-                <a:latin typeface="Arial" charset="0"/>
-              </a:defRPr>
-            </a:lvl5pPr>
-            <a:lvl6pPr marL="2514600" indent="-228600" eaLnBrk="0" fontAlgn="base" hangingPunct="0">
-              <a:spcBef>
-                <a:spcPct val="0"/>
-              </a:spcBef>
-              <a:spcAft>
-                <a:spcPct val="0"/>
-              </a:spcAft>
-              <a:defRPr>
-                <a:solidFill>
-                  <a:schemeClr val="tx1"/>
-                </a:solidFill>
-                <a:latin typeface="Arial" charset="0"/>
-              </a:defRPr>
-            </a:lvl6pPr>
-            <a:lvl7pPr marL="2971800" indent="-228600" eaLnBrk="0" fontAlgn="base" hangingPunct="0">
-              <a:spcBef>
-                <a:spcPct val="0"/>
-              </a:spcBef>
-              <a:spcAft>
-                <a:spcPct val="0"/>
-              </a:spcAft>
-              <a:defRPr>
-                <a:solidFill>
-                  <a:schemeClr val="tx1"/>
-                </a:solidFill>
-                <a:latin typeface="Arial" charset="0"/>
-              </a:defRPr>
-            </a:lvl7pPr>
-            <a:lvl8pPr marL="3429000" indent="-228600" eaLnBrk="0" fontAlgn="base" hangingPunct="0">
-              <a:spcBef>
-                <a:spcPct val="0"/>
-              </a:spcBef>
-              <a:spcAft>
-                <a:spcPct val="0"/>
-              </a:spcAft>
-              <a:defRPr>
-                <a:solidFill>
-                  <a:schemeClr val="tx1"/>
-                </a:solidFill>
-                <a:latin typeface="Arial" charset="0"/>
-              </a:defRPr>
-            </a:lvl8pPr>
-            <a:lvl9pPr marL="3886200" indent="-228600" eaLnBrk="0" fontAlgn="base" hangingPunct="0">
-              <a:spcBef>
-                <a:spcPct val="0"/>
-              </a:spcBef>
-              <a:spcAft>
-                <a:spcPct val="0"/>
-              </a:spcAft>
-              <a:defRPr>
-                <a:solidFill>
-                  <a:schemeClr val="tx1"/>
-                </a:solidFill>
-                <a:latin typeface="Arial" charset="0"/>
-              </a:defRPr>
-            </a:lvl9pPr>
-          </a:lstStyle>
-          <a:p>
-            <a:pPr>
-              <a:spcAft>
-                <a:spcPct val="20000"/>
-              </a:spcAft>
-              <a:buSzPct val="100000"/>
-            </a:pPr>
-            <a:r>
-              <a:rPr lang="en-US" altLang="en-US" sz="2400" dirty="0" smtClean="0">
-                <a:solidFill>
-                  <a:srgbClr val="D30AA5"/>
-                </a:solidFill>
-              </a:rPr>
-              <a:t>      </a:t>
-            </a:r>
-            <a:r>
-              <a:rPr lang="en-US" altLang="en-US" sz="4800" dirty="0" smtClean="0">
-                <a:solidFill>
-                  <a:srgbClr val="D30AA5"/>
-                </a:solidFill>
-                <a:latin typeface="Cordia New" panose="020B0304020202020204" pitchFamily="34" charset="-34"/>
-                <a:cs typeface="Cordia New" panose="020B0304020202020204" pitchFamily="34" charset="-34"/>
-              </a:rPr>
-              <a:t>checkin-test.py --do-all --push</a:t>
-            </a:r>
-            <a:endParaRPr lang="en-US" altLang="en-US" sz="2400" dirty="0">
-              <a:solidFill>
-                <a:srgbClr val="D30AA5"/>
-              </a:solidFill>
-            </a:endParaRPr>
-          </a:p>
-          <a:p>
-            <a:pPr>
-              <a:spcAft>
-                <a:spcPct val="20000"/>
-              </a:spcAft>
-              <a:buSzPct val="100000"/>
-              <a:buFont typeface="Arial" charset="0"/>
-              <a:buChar char="•"/>
-            </a:pPr>
-            <a:r>
-              <a:rPr lang="en-US" altLang="en-US" sz="2400" dirty="0" smtClean="0"/>
-              <a:t>Integrates with latest version in remote </a:t>
-            </a:r>
-            <a:r>
-              <a:rPr lang="en-US" altLang="en-US" sz="2400" dirty="0" err="1" smtClean="0"/>
-              <a:t>git</a:t>
-            </a:r>
-            <a:r>
-              <a:rPr lang="en-US" altLang="en-US" sz="2400" dirty="0" smtClean="0"/>
-              <a:t> repositories</a:t>
-            </a:r>
-          </a:p>
-          <a:p>
-            <a:pPr>
-              <a:spcAft>
-                <a:spcPct val="20000"/>
-              </a:spcAft>
-              <a:buSzPct val="100000"/>
-              <a:buFont typeface="Arial" charset="0"/>
-              <a:buChar char="•"/>
-            </a:pPr>
-            <a:r>
-              <a:rPr lang="en-US" altLang="en-US" sz="2400" dirty="0" smtClean="0"/>
-              <a:t>Figures </a:t>
-            </a:r>
-            <a:r>
-              <a:rPr lang="en-US" altLang="en-US" sz="2400" dirty="0"/>
-              <a:t>out </a:t>
-            </a:r>
-            <a:r>
-              <a:rPr lang="en-US" altLang="en-US" sz="2400" dirty="0" smtClean="0"/>
-              <a:t>modified packages</a:t>
-            </a:r>
-          </a:p>
-          <a:p>
-            <a:pPr marL="457200" lvl="2" indent="0">
-              <a:spcAft>
-                <a:spcPts val="0"/>
-              </a:spcAft>
-              <a:buSzPct val="100000"/>
-            </a:pPr>
-            <a:r>
-              <a:rPr lang="en-US" altLang="en-US" sz="3600" dirty="0" smtClean="0">
-                <a:solidFill>
-                  <a:srgbClr val="008657"/>
-                </a:solidFill>
-                <a:latin typeface="Cordia New" panose="020B0304020202020204" pitchFamily="34" charset="-34"/>
-                <a:cs typeface="Cordia New" panose="020B0304020202020204" pitchFamily="34" charset="-34"/>
-              </a:rPr>
-              <a:t>Modified </a:t>
-            </a:r>
-            <a:r>
-              <a:rPr lang="en-US" altLang="en-US" sz="3600" dirty="0">
-                <a:solidFill>
-                  <a:srgbClr val="008657"/>
-                </a:solidFill>
-                <a:latin typeface="Cordia New" panose="020B0304020202020204" pitchFamily="34" charset="-34"/>
-                <a:cs typeface="Cordia New" panose="020B0304020202020204" pitchFamily="34" charset="-34"/>
-              </a:rPr>
-              <a:t>file: 'packages/</a:t>
-            </a:r>
-            <a:r>
-              <a:rPr lang="en-US" altLang="en-US" sz="3600" dirty="0" err="1">
-                <a:solidFill>
-                  <a:srgbClr val="008657"/>
-                </a:solidFill>
-                <a:latin typeface="Cordia New" panose="020B0304020202020204" pitchFamily="34" charset="-34"/>
-                <a:cs typeface="Cordia New" panose="020B0304020202020204" pitchFamily="34" charset="-34"/>
-              </a:rPr>
-              <a:t>teuchos</a:t>
-            </a:r>
-            <a:r>
-              <a:rPr lang="en-US" altLang="en-US" sz="3600" dirty="0">
-                <a:solidFill>
-                  <a:srgbClr val="008657"/>
-                </a:solidFill>
-                <a:latin typeface="Cordia New" panose="020B0304020202020204" pitchFamily="34" charset="-34"/>
-                <a:cs typeface="Cordia New" panose="020B0304020202020204" pitchFamily="34" charset="-34"/>
-              </a:rPr>
-              <a:t>/CMakeLists.txt'</a:t>
-            </a:r>
-          </a:p>
-          <a:p>
-            <a:pPr marL="457200" lvl="2" indent="0">
-              <a:spcAft>
-                <a:spcPts val="0"/>
-              </a:spcAft>
-              <a:buSzPct val="100000"/>
-            </a:pPr>
-            <a:r>
-              <a:rPr lang="en-US" altLang="en-US" sz="3600" dirty="0">
-                <a:solidFill>
-                  <a:srgbClr val="008657"/>
-                </a:solidFill>
-                <a:latin typeface="Cordia New" panose="020B0304020202020204" pitchFamily="34" charset="-34"/>
-                <a:cs typeface="Cordia New" panose="020B0304020202020204" pitchFamily="34" charset="-34"/>
-              </a:rPr>
-              <a:t>  =&gt; Enabling 'Teuchos'!</a:t>
-            </a:r>
-          </a:p>
-          <a:p>
-            <a:pPr>
-              <a:spcAft>
-                <a:spcPct val="20000"/>
-              </a:spcAft>
-              <a:buSzPct val="100000"/>
-              <a:buFont typeface="Arial" charset="0"/>
-              <a:buChar char="•"/>
-            </a:pPr>
-            <a:r>
-              <a:rPr lang="en-US" altLang="en-US" sz="2400" dirty="0" smtClean="0"/>
-              <a:t>Enables </a:t>
-            </a:r>
-            <a:r>
-              <a:rPr lang="en-US" altLang="en-US" sz="2400" dirty="0"/>
-              <a:t>all </a:t>
-            </a:r>
-            <a:r>
-              <a:rPr lang="en-US" altLang="en-US" sz="2400" dirty="0" smtClean="0"/>
-              <a:t>forward/downstream packages &amp; tests</a:t>
-            </a:r>
-            <a:endParaRPr lang="en-US" altLang="en-US" sz="2400" dirty="0"/>
-          </a:p>
-          <a:p>
-            <a:pPr>
-              <a:spcAft>
-                <a:spcPct val="20000"/>
-              </a:spcAft>
-              <a:buSzPct val="100000"/>
-              <a:buFont typeface="Arial" charset="0"/>
-              <a:buChar char="•"/>
-            </a:pPr>
-            <a:r>
-              <a:rPr lang="en-US" altLang="en-US" sz="2400" dirty="0"/>
-              <a:t>Configures, </a:t>
-            </a:r>
-            <a:r>
-              <a:rPr lang="en-US" altLang="en-US" sz="2400" dirty="0" smtClean="0"/>
-              <a:t>builds, and runs tests</a:t>
-            </a:r>
-          </a:p>
-          <a:p>
-            <a:pPr>
-              <a:spcAft>
-                <a:spcPct val="20000"/>
-              </a:spcAft>
-              <a:buSzPct val="100000"/>
-              <a:buFont typeface="Arial" charset="0"/>
-              <a:buChar char="•"/>
-            </a:pPr>
-            <a:r>
-              <a:rPr lang="en-US" altLang="en-US" sz="2400" dirty="0" smtClean="0"/>
-              <a:t>Does the push (if all builds/tests pass)</a:t>
-            </a:r>
-            <a:endParaRPr lang="en-US" altLang="en-US" sz="2400" dirty="0"/>
-          </a:p>
-          <a:p>
-            <a:pPr>
-              <a:spcAft>
-                <a:spcPct val="20000"/>
-              </a:spcAft>
-              <a:buSzPct val="100000"/>
-              <a:buFont typeface="Arial" charset="0"/>
-              <a:buChar char="•"/>
-            </a:pPr>
-            <a:r>
-              <a:rPr lang="en-US" altLang="en-US" sz="2400" dirty="0"/>
-              <a:t>Sends </a:t>
-            </a:r>
-            <a:r>
-              <a:rPr lang="en-US" altLang="en-US" sz="2400" dirty="0" smtClean="0"/>
-              <a:t>notification emails</a:t>
-            </a:r>
-            <a:endParaRPr lang="en-US" altLang="en-US" sz="2400" dirty="0"/>
-          </a:p>
-          <a:p>
-            <a:pPr>
-              <a:spcAft>
-                <a:spcPct val="20000"/>
-              </a:spcAft>
-              <a:buSzPct val="100000"/>
-              <a:buFont typeface="Arial" charset="0"/>
-              <a:buChar char="•"/>
-            </a:pPr>
-            <a:r>
-              <a:rPr lang="en-US" altLang="en-US" sz="2400" dirty="0" smtClean="0"/>
-              <a:t>Fully </a:t>
-            </a:r>
-            <a:r>
-              <a:rPr lang="en-US" altLang="en-US" sz="2400" dirty="0"/>
-              <a:t>customizable (enabled packages, build cases, etc.)</a:t>
-            </a:r>
-          </a:p>
-          <a:p>
-            <a:pPr>
-              <a:spcAft>
-                <a:spcPct val="20000"/>
-              </a:spcAft>
-              <a:buSzPct val="100000"/>
-              <a:buFont typeface="Arial" charset="0"/>
-              <a:buChar char="•"/>
-            </a:pPr>
-            <a:r>
-              <a:rPr lang="en-US" altLang="en-US" sz="2400" dirty="0"/>
-              <a:t>Documentation: </a:t>
-            </a:r>
-            <a:r>
-              <a:rPr lang="en-US" altLang="en-US" sz="2400" dirty="0">
-                <a:solidFill>
-                  <a:srgbClr val="D30AA5"/>
-                </a:solidFill>
-              </a:rPr>
-              <a:t>checkin-test.py --help</a:t>
-            </a:r>
-          </a:p>
-        </p:txBody>
-      </p:sp>
-    </p:spTree>
-    <p:extLst>
-      <p:ext uri="{BB962C8B-B14F-4D97-AF65-F5344CB8AC3E}">
-        <p14:creationId xmlns:p14="http://schemas.microsoft.com/office/powerpoint/2010/main" val="3198129426"/>
-      </p:ext>
-    </p:extLst>
-  </p:cSld>
-  <p:clrMapOvr>
-    <a:masterClrMapping/>
-  </p:clrMapOvr>
-  <p:transition advTm="75766">
-    <p:dissolve/>
-  </p:transition>
-  <p:timing>
-    <p:tnLst>
-      <p:par>
-        <p:cTn id="1" dur="indefinite" restart="never" nodeType="tmRoot"/>
-      </p:par>
-    </p:tnLst>
-  </p:timing>
-</p:sld>
-</file>
-
-<file path=ppt/slides/slide21.xml><?xml version="1.0" encoding="utf-8"?>
 <p:sld xmlns:a="http://schemas.openxmlformats.org/drawingml/2006/main" xmlns:r="http://schemas.openxmlformats.org/officeDocument/2006/relationships" xmlns:p="http://schemas.openxmlformats.org/presentationml/2006/main">
   <p:cSld>
     <p:spTree>
@@ -27110,7 +26897,7 @@
 </p:sld>
 </file>
 
-<file path=ppt/slides/slide22.xml><?xml version="1.0" encoding="utf-8"?>
+<file path=ppt/slides/slide21.xml><?xml version="1.0" encoding="utf-8"?>
 <p:sld xmlns:a="http://schemas.openxmlformats.org/drawingml/2006/main" xmlns:r="http://schemas.openxmlformats.org/officeDocument/2006/relationships" xmlns:p="http://schemas.openxmlformats.org/presentationml/2006/main">
   <p:cSld>
     <p:spTree>
@@ -27521,7 +27308,7 @@
 </p:sld>
 </file>
 
-<file path=ppt/slides/slide23.xml><?xml version="1.0" encoding="utf-8"?>
+<file path=ppt/slides/slide22.xml><?xml version="1.0" encoding="utf-8"?>
 <p:sld xmlns:a="http://schemas.openxmlformats.org/drawingml/2006/main" xmlns:r="http://schemas.openxmlformats.org/officeDocument/2006/relationships" xmlns:p="http://schemas.openxmlformats.org/presentationml/2006/main">
   <p:cSld>
     <p:spTree>
@@ -27759,18 +27546,7 @@
                 </a:solidFill>
                 <a:latin typeface="+mj-lt"/>
               </a:rPr>
-              <a:t>Why CMake</a:t>
-            </a:r>
-            <a:r>
-              <a:rPr lang="en-US" sz="4000" b="1" dirty="0" smtClean="0">
-                <a:solidFill>
-                  <a:schemeClr val="accent1">
-                    <a:lumMod val="75000"/>
-                  </a:schemeClr>
-                </a:solidFill>
-                <a:latin typeface="+mj-lt"/>
-              </a:rPr>
-              <a:t>?</a:t>
+              <a:t>Why CMake?</a:t>
             </a:r>
           </a:p>
           <a:p>
@@ -28284,7 +28060,7 @@
     </p:spTree>
     <p:extLst>
       <p:ext uri="{BB962C8B-B14F-4D97-AF65-F5344CB8AC3E}">
-        <p14:creationId xmlns:p14="http://schemas.microsoft.com/office/powerpoint/2010/main" val="3208097042"/>
+        <p14:creationId xmlns:p14="http://schemas.microsoft.com/office/powerpoint/2010/main" val="211169156"/>
       </p:ext>
     </p:extLst>
   </p:cSld>
@@ -28338,481 +28114,6 @@
           <a:p>
             <a:r>
               <a:rPr lang="en-US" altLang="en-US" dirty="0" smtClean="0"/>
-              <a:t>Why CMake?</a:t>
-            </a:r>
-          </a:p>
-        </p:txBody>
-      </p:sp>
-      <p:sp>
-        <p:nvSpPr>
-          <p:cNvPr id="4" name="Rectangle 3"/>
-          <p:cNvSpPr>
-            <a:spLocks noChangeArrowheads="1"/>
-          </p:cNvSpPr>
-          <p:nvPr/>
-        </p:nvSpPr>
-        <p:spPr bwMode="auto">
-          <a:xfrm>
-            <a:off x="40210" y="524399"/>
-            <a:ext cx="9103790" cy="6368410"/>
-          </a:xfrm>
-          <a:prstGeom prst="rect">
-            <a:avLst/>
-          </a:prstGeom>
-          <a:noFill/>
-          <a:ln>
-            <a:noFill/>
-          </a:ln>
-          <a:extLst>
-            <a:ext uri="{909E8E84-426E-40DD-AFC4-6F175D3DCCD1}">
-              <a14:hiddenFill xmlns:a14="http://schemas.microsoft.com/office/drawing/2010/main">
-                <a:solidFill>
-                  <a:srgbClr val="FFFFFF"/>
-                </a:solidFill>
-              </a14:hiddenFill>
-            </a:ext>
-            <a:ext uri="{91240B29-F687-4F45-9708-019B960494DF}">
-              <a14:hiddenLine xmlns:a14="http://schemas.microsoft.com/office/drawing/2010/main" w="12700">
-                <a:solidFill>
-                  <a:srgbClr val="000000"/>
-                </a:solidFill>
-                <a:miter lim="800000"/>
-                <a:headEnd/>
-                <a:tailEnd/>
-              </a14:hiddenLine>
-            </a:ext>
-          </a:extLst>
-        </p:spPr>
-        <p:txBody>
-          <a:bodyPr wrap="square" lIns="90487" tIns="44450" rIns="90487" bIns="44450">
-            <a:spAutoFit/>
-          </a:bodyPr>
-          <a:lstStyle/>
-          <a:p>
-            <a:pPr lvl="1" indent="-285750">
-              <a:spcAft>
-                <a:spcPts val="0"/>
-              </a:spcAft>
-              <a:buSzPct val="100000"/>
-              <a:buFont typeface="Arial" pitchFamily="34" charset="0"/>
-              <a:buChar char="•"/>
-              <a:defRPr/>
-            </a:pPr>
-            <a:r>
-              <a:rPr lang="en-US" sz="2400" dirty="0"/>
-              <a:t>Open-source tools maintained and used by a large community and supported by a profession software development company (Kitware).</a:t>
-            </a:r>
-          </a:p>
-          <a:p>
-            <a:pPr lvl="1" indent="-285750">
-              <a:spcAft>
-                <a:spcPts val="0"/>
-              </a:spcAft>
-              <a:buSzPct val="100000"/>
-              <a:buFont typeface="Arial" pitchFamily="34" charset="0"/>
-              <a:buChar char="•"/>
-              <a:defRPr/>
-            </a:pPr>
-            <a:r>
-              <a:rPr lang="en-US" sz="2800" b="1" dirty="0" smtClean="0">
-                <a:solidFill>
-                  <a:srgbClr val="000099"/>
-                </a:solidFill>
-              </a:rPr>
-              <a:t>CMake:</a:t>
-            </a:r>
-          </a:p>
-          <a:p>
-            <a:pPr lvl="2" indent="-285750">
-              <a:spcAft>
-                <a:spcPts val="0"/>
-              </a:spcAft>
-              <a:buSzPct val="100000"/>
-              <a:buFont typeface="Arial" pitchFamily="34" charset="0"/>
-              <a:buChar char="•"/>
-              <a:defRPr/>
-            </a:pPr>
-            <a:r>
-              <a:rPr lang="en-US" sz="2000" dirty="0" smtClean="0"/>
-              <a:t>Simplified </a:t>
-            </a:r>
-            <a:r>
-              <a:rPr lang="en-US" sz="2000" dirty="0"/>
-              <a:t>build </a:t>
-            </a:r>
-            <a:r>
-              <a:rPr lang="en-US" sz="2000" dirty="0" smtClean="0"/>
-              <a:t>system, easier maintenance</a:t>
-            </a:r>
-            <a:endParaRPr lang="en-US" sz="2000" dirty="0"/>
-          </a:p>
-          <a:p>
-            <a:pPr lvl="2" indent="-285750">
-              <a:spcAft>
-                <a:spcPts val="0"/>
-              </a:spcAft>
-              <a:buSzPct val="100000"/>
-              <a:buFont typeface="Arial" pitchFamily="34" charset="0"/>
-              <a:buChar char="•"/>
-              <a:defRPr/>
-            </a:pPr>
-            <a:r>
-              <a:rPr lang="en-US" sz="2000" dirty="0" smtClean="0"/>
-              <a:t>Improved </a:t>
-            </a:r>
-            <a:r>
-              <a:rPr lang="en-US" sz="2000" dirty="0"/>
-              <a:t>mechanism for extending capabilities </a:t>
-            </a:r>
-            <a:r>
-              <a:rPr lang="en-US" sz="2000" dirty="0" smtClean="0"/>
-              <a:t>(CMake language)</a:t>
-            </a:r>
-            <a:endParaRPr lang="en-US" sz="2000" dirty="0"/>
-          </a:p>
-          <a:p>
-            <a:pPr lvl="2" indent="-285750">
-              <a:spcAft>
-                <a:spcPts val="0"/>
-              </a:spcAft>
-              <a:buSzPct val="100000"/>
-              <a:buFont typeface="Arial" pitchFamily="34" charset="0"/>
-              <a:buChar char="•"/>
-              <a:defRPr/>
-            </a:pPr>
-            <a:r>
-              <a:rPr lang="en-US" sz="2000" dirty="0" smtClean="0"/>
-              <a:t>Support </a:t>
-            </a:r>
-            <a:r>
-              <a:rPr lang="en-US" sz="2000" dirty="0"/>
-              <a:t>for all major C, C++, and Fortran compilers.</a:t>
-            </a:r>
-          </a:p>
-          <a:p>
-            <a:pPr lvl="2" indent="-285750">
-              <a:spcAft>
-                <a:spcPts val="0"/>
-              </a:spcAft>
-              <a:buSzPct val="100000"/>
-              <a:buFont typeface="Arial" pitchFamily="34" charset="0"/>
-              <a:buChar char="•"/>
-              <a:defRPr/>
-            </a:pPr>
-            <a:r>
-              <a:rPr lang="en-US" sz="2000" dirty="0" smtClean="0"/>
-              <a:t>Automatic full </a:t>
-            </a:r>
-            <a:r>
-              <a:rPr lang="en-US" sz="2000" dirty="0"/>
-              <a:t>dependency </a:t>
-            </a:r>
-            <a:r>
-              <a:rPr lang="en-US" sz="2000" dirty="0" smtClean="0"/>
-              <a:t>tracking (headers, src, mod, obj, libs, exec)</a:t>
-            </a:r>
-            <a:endParaRPr lang="en-US" sz="2000" dirty="0"/>
-          </a:p>
-          <a:p>
-            <a:pPr lvl="2" indent="-285750">
-              <a:spcAft>
-                <a:spcPts val="0"/>
-              </a:spcAft>
-              <a:buSzPct val="100000"/>
-              <a:buFont typeface="Arial" pitchFamily="34" charset="0"/>
-              <a:buChar char="•"/>
-              <a:defRPr/>
-            </a:pPr>
-            <a:r>
-              <a:rPr lang="en-US" sz="2000" dirty="0" smtClean="0"/>
-              <a:t>Faster </a:t>
-            </a:r>
-            <a:r>
-              <a:rPr lang="en-US" sz="2000" dirty="0"/>
-              <a:t>configure times (</a:t>
-            </a:r>
-            <a:r>
-              <a:rPr lang="en-US" sz="2000" dirty="0" smtClean="0"/>
-              <a:t>e.g. &gt; 10x faster than autotools)</a:t>
-            </a:r>
-            <a:endParaRPr lang="en-US" sz="2000" dirty="0"/>
-          </a:p>
-          <a:p>
-            <a:pPr lvl="2" indent="-285750">
-              <a:spcAft>
-                <a:spcPts val="0"/>
-              </a:spcAft>
-              <a:buSzPct val="100000"/>
-              <a:buFont typeface="Arial" pitchFamily="34" charset="0"/>
-              <a:buChar char="•"/>
-              <a:defRPr/>
-            </a:pPr>
-            <a:r>
-              <a:rPr lang="en-US" sz="2000" dirty="0" smtClean="0"/>
-              <a:t>Shared </a:t>
-            </a:r>
-            <a:r>
-              <a:rPr lang="en-US" sz="2000" dirty="0"/>
-              <a:t>libraries on </a:t>
-            </a:r>
-            <a:r>
-              <a:rPr lang="en-US" sz="2000" dirty="0" smtClean="0"/>
-              <a:t>all platforms and compilers</a:t>
-            </a:r>
-            <a:endParaRPr lang="en-US" sz="2000" dirty="0"/>
-          </a:p>
-          <a:p>
-            <a:pPr lvl="2" indent="-285750">
-              <a:spcAft>
-                <a:spcPts val="0"/>
-              </a:spcAft>
-              <a:buSzPct val="100000"/>
-              <a:buFont typeface="Arial" pitchFamily="34" charset="0"/>
-              <a:buChar char="•"/>
-              <a:defRPr/>
-            </a:pPr>
-            <a:r>
-              <a:rPr lang="en-US" sz="2000" dirty="0" smtClean="0"/>
-              <a:t>Support </a:t>
-            </a:r>
-            <a:r>
-              <a:rPr lang="en-US" sz="2000" dirty="0"/>
-              <a:t>for MS Windows </a:t>
-            </a:r>
-            <a:r>
-              <a:rPr lang="en-US" sz="2000" dirty="0" smtClean="0"/>
-              <a:t>(e.g. Visual </a:t>
-            </a:r>
-            <a:r>
-              <a:rPr lang="en-US" sz="2000" dirty="0"/>
-              <a:t>Studio </a:t>
-            </a:r>
-            <a:r>
-              <a:rPr lang="en-US" sz="2000" dirty="0" smtClean="0"/>
-              <a:t>projects)</a:t>
-            </a:r>
-            <a:endParaRPr lang="en-US" sz="2000" dirty="0"/>
-          </a:p>
-          <a:p>
-            <a:pPr lvl="2" indent="-285750">
-              <a:spcAft>
-                <a:spcPts val="0"/>
-              </a:spcAft>
-              <a:buSzPct val="100000"/>
-              <a:buFont typeface="Arial" pitchFamily="34" charset="0"/>
-              <a:buChar char="•"/>
-              <a:defRPr/>
-            </a:pPr>
-            <a:r>
-              <a:rPr lang="en-US" sz="2000" dirty="0" smtClean="0"/>
-              <a:t>Portable support </a:t>
-            </a:r>
-            <a:r>
-              <a:rPr lang="en-US" sz="2000" dirty="0"/>
-              <a:t>for </a:t>
-            </a:r>
-            <a:r>
-              <a:rPr lang="en-US" sz="2000" dirty="0" smtClean="0"/>
-              <a:t>cross-compiling</a:t>
-            </a:r>
-            <a:endParaRPr lang="en-US" sz="2000" dirty="0"/>
-          </a:p>
-          <a:p>
-            <a:pPr lvl="2" indent="-285750">
-              <a:spcAft>
-                <a:spcPts val="0"/>
-              </a:spcAft>
-              <a:buSzPct val="100000"/>
-              <a:buFont typeface="Arial" pitchFamily="34" charset="0"/>
-              <a:buChar char="•"/>
-              <a:defRPr/>
-            </a:pPr>
-            <a:r>
-              <a:rPr lang="en-US" sz="2000" dirty="0" smtClean="0"/>
-              <a:t>Good Fortran support (parallel builds with modules with </a:t>
-            </a:r>
-            <a:r>
-              <a:rPr lang="en-US" sz="2000" dirty="0" err="1" smtClean="0"/>
-              <a:t>src</a:t>
-            </a:r>
-            <a:r>
-              <a:rPr lang="en-US" sz="2000" dirty="0" smtClean="0"/>
-              <a:t> =&gt; mod =&gt; object tracking, C/Fortran interoperability, etc.)</a:t>
-            </a:r>
-          </a:p>
-          <a:p>
-            <a:pPr lvl="1" indent="-285750">
-              <a:spcAft>
-                <a:spcPts val="0"/>
-              </a:spcAft>
-              <a:buSzPct val="100000"/>
-              <a:buFont typeface="Arial" pitchFamily="34" charset="0"/>
-              <a:buChar char="•"/>
-              <a:defRPr/>
-            </a:pPr>
-            <a:r>
-              <a:rPr lang="en-US" sz="2800" b="1" dirty="0" smtClean="0">
-                <a:solidFill>
-                  <a:srgbClr val="000099"/>
-                </a:solidFill>
-              </a:rPr>
-              <a:t>CTest:</a:t>
-            </a:r>
-          </a:p>
-          <a:p>
-            <a:pPr lvl="2" indent="-285750">
-              <a:spcAft>
-                <a:spcPts val="0"/>
-              </a:spcAft>
-              <a:buSzPct val="100000"/>
-              <a:buFont typeface="Arial" pitchFamily="34" charset="0"/>
-              <a:buChar char="•"/>
-              <a:defRPr/>
-            </a:pPr>
-            <a:r>
-              <a:rPr lang="en-US" sz="2000" dirty="0" smtClean="0"/>
-              <a:t>Parallel </a:t>
-            </a:r>
-            <a:r>
-              <a:rPr lang="en-US" sz="2000" dirty="0"/>
-              <a:t>running and scheduling of tests and test </a:t>
-            </a:r>
-            <a:r>
-              <a:rPr lang="en-US" sz="2000" dirty="0" smtClean="0"/>
-              <a:t>time-outs</a:t>
-            </a:r>
-            <a:endParaRPr lang="en-US" sz="2000" dirty="0"/>
-          </a:p>
-          <a:p>
-            <a:pPr lvl="2" indent="-285750">
-              <a:spcAft>
-                <a:spcPts val="0"/>
-              </a:spcAft>
-              <a:buSzPct val="100000"/>
-              <a:buFont typeface="Arial" pitchFamily="34" charset="0"/>
-              <a:buChar char="•"/>
-              <a:defRPr/>
-            </a:pPr>
-            <a:r>
-              <a:rPr lang="en-US" sz="2000" dirty="0" smtClean="0"/>
-              <a:t>Memory </a:t>
-            </a:r>
-            <a:r>
-              <a:rPr lang="en-US" sz="2000" dirty="0"/>
-              <a:t>testing </a:t>
-            </a:r>
-            <a:r>
-              <a:rPr lang="en-US" sz="2000" dirty="0" smtClean="0"/>
-              <a:t>(Valgrind)</a:t>
-            </a:r>
-            <a:endParaRPr lang="en-US" sz="2000" dirty="0"/>
-          </a:p>
-          <a:p>
-            <a:pPr lvl="2" indent="-285750">
-              <a:spcAft>
-                <a:spcPts val="0"/>
-              </a:spcAft>
-              <a:buSzPct val="100000"/>
-              <a:buFont typeface="Arial" pitchFamily="34" charset="0"/>
-              <a:buChar char="•"/>
-              <a:defRPr/>
-            </a:pPr>
-            <a:r>
-              <a:rPr lang="en-US" sz="2000" dirty="0" smtClean="0"/>
-              <a:t>Line </a:t>
-            </a:r>
-            <a:r>
-              <a:rPr lang="en-US" sz="2000" dirty="0"/>
-              <a:t>coverage </a:t>
-            </a:r>
-            <a:r>
-              <a:rPr lang="en-US" sz="2000" dirty="0" smtClean="0"/>
-              <a:t>testing (GCC LCOV)</a:t>
-            </a:r>
-            <a:endParaRPr lang="en-US" sz="2000" dirty="0"/>
-          </a:p>
-          <a:p>
-            <a:pPr lvl="2" indent="-285750">
-              <a:spcAft>
-                <a:spcPts val="0"/>
-              </a:spcAft>
-              <a:buSzPct val="100000"/>
-              <a:buFont typeface="Arial" pitchFamily="34" charset="0"/>
-              <a:buChar char="•"/>
-              <a:defRPr/>
-            </a:pPr>
-            <a:r>
-              <a:rPr lang="en-US" sz="2000" dirty="0" smtClean="0"/>
-              <a:t>Better </a:t>
-            </a:r>
-            <a:r>
-              <a:rPr lang="en-US" sz="2000" dirty="0"/>
-              <a:t>integration between the test system and the build </a:t>
-            </a:r>
-            <a:r>
-              <a:rPr lang="en-US" sz="2000" dirty="0" smtClean="0"/>
-              <a:t>system</a:t>
-            </a:r>
-          </a:p>
-        </p:txBody>
-      </p:sp>
-    </p:spTree>
-    <p:extLst>
-      <p:ext uri="{BB962C8B-B14F-4D97-AF65-F5344CB8AC3E}">
-        <p14:creationId xmlns:p14="http://schemas.microsoft.com/office/powerpoint/2010/main" val="211169156"/>
-      </p:ext>
-    </p:extLst>
-  </p:cSld>
-  <p:clrMapOvr>
-    <a:masterClrMapping/>
-  </p:clrMapOvr>
-  <p:transition advTm="75766">
-    <p:dissolve/>
-  </p:transition>
-  <p:timing>
-    <p:tnLst>
-      <p:par>
-        <p:cTn id="1" dur="indefinite" restart="never" nodeType="tmRoot"/>
-      </p:par>
-    </p:tnLst>
-  </p:timing>
-</p:sld>
-</file>
-
-<file path=ppt/slides/slide6.xml><?xml version="1.0" encoding="utf-8"?>
-<p:sld xmlns:a="http://schemas.openxmlformats.org/drawingml/2006/main" xmlns:r="http://schemas.openxmlformats.org/officeDocument/2006/relationships" xmlns:p="http://schemas.openxmlformats.org/presentationml/2006/main">
-  <p:cSld>
-    <p:spTree>
-      <p:nvGrpSpPr>
-        <p:cNvPr id="1" name=""/>
-        <p:cNvGrpSpPr/>
-        <p:nvPr/>
-      </p:nvGrpSpPr>
-      <p:grpSpPr>
-        <a:xfrm>
-          <a:off x="0" y="0"/>
-          <a:ext cx="0" cy="0"/>
-          <a:chOff x="0" y="0"/>
-          <a:chExt cx="0" cy="0"/>
-        </a:xfrm>
-      </p:grpSpPr>
-      <p:sp>
-        <p:nvSpPr>
-          <p:cNvPr id="3075" name="Rectangle 2"/>
-          <p:cNvSpPr>
-            <a:spLocks noGrp="1" noChangeArrowheads="1"/>
-          </p:cNvSpPr>
-          <p:nvPr>
-            <p:ph type="title"/>
-          </p:nvPr>
-        </p:nvSpPr>
-        <p:spPr/>
-        <p:txBody>
-          <a:bodyPr/>
-          <a:lstStyle/>
-          <a:p>
-            <a:r>
-              <a:rPr lang="en-US" altLang="en-US" dirty="0" smtClean="0"/>
               <a:t>Why TriBITS?</a:t>
             </a:r>
           </a:p>
@@ -29067,7 +28368,7 @@
 </p:sld>
 </file>
 
-<file path=ppt/slides/slide7.xml><?xml version="1.0" encoding="utf-8"?>
+<file path=ppt/slides/slide6.xml><?xml version="1.0" encoding="utf-8"?>
 <p:sld xmlns:a="http://schemas.openxmlformats.org/drawingml/2006/main" xmlns:r="http://schemas.openxmlformats.org/officeDocument/2006/relationships" xmlns:p="http://schemas.openxmlformats.org/presentationml/2006/main">
   <p:cSld>
     <p:spTree>
@@ -29159,7 +28460,7 @@
 </p:sld>
 </file>
 
-<file path=ppt/slides/slide8.xml><?xml version="1.0" encoding="utf-8"?>
+<file path=ppt/slides/slide7.xml><?xml version="1.0" encoding="utf-8"?>
 <p:sld xmlns:a="http://schemas.openxmlformats.org/drawingml/2006/main" xmlns:r="http://schemas.openxmlformats.org/officeDocument/2006/relationships" xmlns:p="http://schemas.openxmlformats.org/presentationml/2006/main">
   <p:cSld>
     <p:spTree>
@@ -29590,6 +28891,393 @@
     <p:extLst>
       <p:ext uri="{BB962C8B-B14F-4D97-AF65-F5344CB8AC3E}">
         <p14:creationId xmlns:p14="http://schemas.microsoft.com/office/powerpoint/2010/main" val="2632381414"/>
+      </p:ext>
+    </p:extLst>
+  </p:cSld>
+  <p:clrMapOvr>
+    <a:masterClrMapping/>
+  </p:clrMapOvr>
+  <p:transition advTm="75766">
+    <p:dissolve/>
+  </p:transition>
+  <p:timing>
+    <p:tnLst>
+      <p:par>
+        <p:cTn id="1" dur="indefinite" restart="never" nodeType="tmRoot"/>
+      </p:par>
+    </p:tnLst>
+  </p:timing>
+</p:sld>
+</file>
+
+<file path=ppt/slides/slide8.xml><?xml version="1.0" encoding="utf-8"?>
+<p:sld xmlns:a="http://schemas.openxmlformats.org/drawingml/2006/main" xmlns:r="http://schemas.openxmlformats.org/officeDocument/2006/relationships" xmlns:p="http://schemas.openxmlformats.org/presentationml/2006/main">
+  <p:cSld>
+    <p:spTree>
+      <p:nvGrpSpPr>
+        <p:cNvPr id="1" name=""/>
+        <p:cNvGrpSpPr/>
+        <p:nvPr/>
+      </p:nvGrpSpPr>
+      <p:grpSpPr>
+        <a:xfrm>
+          <a:off x="0" y="0"/>
+          <a:ext cx="0" cy="0"/>
+          <a:chOff x="0" y="0"/>
+          <a:chExt cx="0" cy="0"/>
+        </a:xfrm>
+      </p:grpSpPr>
+      <p:sp>
+        <p:nvSpPr>
+          <p:cNvPr id="3075" name="Rectangle 2"/>
+          <p:cNvSpPr>
+            <a:spLocks noGrp="1" noChangeArrowheads="1"/>
+          </p:cNvSpPr>
+          <p:nvPr>
+            <p:ph type="title"/>
+          </p:nvPr>
+        </p:nvSpPr>
+        <p:spPr>
+          <a:xfrm>
+            <a:off x="424259" y="126170"/>
+            <a:ext cx="8526065" cy="381000"/>
+          </a:xfrm>
+        </p:spPr>
+        <p:txBody>
+          <a:bodyPr/>
+          <a:lstStyle/>
+          <a:p>
+            <a:r>
+              <a:rPr lang="en-US" altLang="en-US" dirty="0" smtClean="0"/>
+              <a:t>TriBITS Package CMakeList.txt File</a:t>
+            </a:r>
+          </a:p>
+        </p:txBody>
+      </p:sp>
+      <p:sp>
+        <p:nvSpPr>
+          <p:cNvPr id="5" name="Rectangle 3"/>
+          <p:cNvSpPr>
+            <a:spLocks noChangeArrowheads="1"/>
+          </p:cNvSpPr>
+          <p:nvPr/>
+        </p:nvSpPr>
+        <p:spPr bwMode="auto">
+          <a:xfrm>
+            <a:off x="654690" y="3787904"/>
+            <a:ext cx="7988550" cy="2675091"/>
+          </a:xfrm>
+          <a:prstGeom prst="rect">
+            <a:avLst/>
+          </a:prstGeom>
+          <a:noFill/>
+          <a:ln>
+            <a:noFill/>
+          </a:ln>
+          <a:extLst>
+            <a:ext uri="{909E8E84-426E-40DD-AFC4-6F175D3DCCD1}">
+              <a14:hiddenFill xmlns:a14="http://schemas.microsoft.com/office/drawing/2010/main">
+                <a:solidFill>
+                  <a:srgbClr val="FFFFFF"/>
+                </a:solidFill>
+              </a14:hiddenFill>
+            </a:ext>
+            <a:ext uri="{91240B29-F687-4F45-9708-019B960494DF}">
+              <a14:hiddenLine xmlns:a14="http://schemas.microsoft.com/office/drawing/2010/main" w="12700">
+                <a:solidFill>
+                  <a:srgbClr val="000000"/>
+                </a:solidFill>
+                <a:miter lim="800000"/>
+                <a:headEnd/>
+                <a:tailEnd/>
+              </a14:hiddenLine>
+            </a:ext>
+          </a:extLst>
+        </p:spPr>
+        <p:txBody>
+          <a:bodyPr wrap="square" lIns="90487" tIns="44450" rIns="90487" bIns="44450">
+            <a:spAutoFit/>
+          </a:bodyPr>
+          <a:lstStyle/>
+          <a:p>
+            <a:pPr lvl="1" indent="-285750">
+              <a:spcAft>
+                <a:spcPts val="0"/>
+              </a:spcAft>
+              <a:buSzPct val="100000"/>
+              <a:buFont typeface="Arial" pitchFamily="34" charset="0"/>
+              <a:buChar char="•"/>
+              <a:defRPr/>
+            </a:pPr>
+            <a:r>
+              <a:rPr lang="en-US" sz="2800" dirty="0" smtClean="0"/>
+              <a:t>Library linking automatically handled</a:t>
+            </a:r>
+          </a:p>
+          <a:p>
+            <a:pPr lvl="1" indent="-285750">
+              <a:spcAft>
+                <a:spcPts val="0"/>
+              </a:spcAft>
+              <a:buSzPct val="100000"/>
+              <a:buFont typeface="Arial" pitchFamily="34" charset="0"/>
+              <a:buChar char="•"/>
+              <a:defRPr/>
+            </a:pPr>
+            <a:r>
+              <a:rPr lang="en-US" sz="2800" dirty="0" smtClean="0"/>
+              <a:t>Avoid duplication and boiler-plate code</a:t>
+            </a:r>
+          </a:p>
+          <a:p>
+            <a:pPr lvl="1" indent="-285750">
+              <a:spcAft>
+                <a:spcPts val="0"/>
+              </a:spcAft>
+              <a:buSzPct val="100000"/>
+              <a:buFont typeface="Arial" pitchFamily="34" charset="0"/>
+              <a:buChar char="•"/>
+              <a:defRPr/>
+            </a:pPr>
+            <a:r>
+              <a:rPr lang="en-US" sz="2800" dirty="0" smtClean="0"/>
+              <a:t>Fewer commands</a:t>
+            </a:r>
+          </a:p>
+          <a:p>
+            <a:pPr lvl="1" indent="-285750">
+              <a:spcAft>
+                <a:spcPts val="0"/>
+              </a:spcAft>
+              <a:buSzPct val="100000"/>
+              <a:buFont typeface="Arial" pitchFamily="34" charset="0"/>
+              <a:buChar char="•"/>
+              <a:defRPr/>
+            </a:pPr>
+            <a:r>
+              <a:rPr lang="en-US" sz="2800" dirty="0" smtClean="0"/>
+              <a:t>Install by default (most common)</a:t>
+            </a:r>
+          </a:p>
+          <a:p>
+            <a:pPr lvl="1" indent="-285750">
+              <a:spcAft>
+                <a:spcPts val="0"/>
+              </a:spcAft>
+              <a:buSzPct val="100000"/>
+              <a:buFont typeface="Arial" pitchFamily="34" charset="0"/>
+              <a:buChar char="•"/>
+              <a:defRPr/>
+            </a:pPr>
+            <a:r>
+              <a:rPr lang="en-US" sz="2800" dirty="0" smtClean="0"/>
+              <a:t>Automatic namespacing of test &amp; exec names</a:t>
+            </a:r>
+          </a:p>
+          <a:p>
+            <a:pPr lvl="1" indent="-285750">
+              <a:spcAft>
+                <a:spcPts val="0"/>
+              </a:spcAft>
+              <a:buSzPct val="100000"/>
+              <a:buFont typeface="Arial" pitchFamily="34" charset="0"/>
+              <a:buChar char="•"/>
+              <a:defRPr/>
+            </a:pPr>
+            <a:endParaRPr lang="en-US" sz="2800" dirty="0"/>
+          </a:p>
+        </p:txBody>
+      </p:sp>
+      <p:sp>
+        <p:nvSpPr>
+          <p:cNvPr id="4" name="Rectangle 3"/>
+          <p:cNvSpPr>
+            <a:spLocks noChangeArrowheads="1"/>
+          </p:cNvSpPr>
+          <p:nvPr/>
+        </p:nvSpPr>
+        <p:spPr bwMode="auto">
+          <a:xfrm>
+            <a:off x="923525" y="866206"/>
+            <a:ext cx="6682625" cy="2582758"/>
+          </a:xfrm>
+          <a:prstGeom prst="rect">
+            <a:avLst/>
+          </a:prstGeom>
+          <a:noFill/>
+          <a:ln w="12700">
+            <a:solidFill>
+              <a:srgbClr val="000000"/>
+            </a:solidFill>
+            <a:miter lim="800000"/>
+            <a:headEnd/>
+            <a:tailEnd/>
+          </a:ln>
+          <a:extLst>
+            <a:ext uri="{909E8E84-426E-40DD-AFC4-6F175D3DCCD1}">
+              <a14:hiddenFill xmlns:a14="http://schemas.microsoft.com/office/drawing/2010/main">
+                <a:solidFill>
+                  <a:srgbClr val="FFFFFF"/>
+                </a:solidFill>
+              </a14:hiddenFill>
+            </a:ext>
+          </a:extLst>
+        </p:spPr>
+        <p:txBody>
+          <a:bodyPr wrap="square" lIns="90487" tIns="44450" rIns="90487" bIns="44450">
+            <a:spAutoFit/>
+          </a:bodyPr>
+          <a:lstStyle/>
+          <a:p>
+            <a:pPr marL="0" lvl="1">
+              <a:spcAft>
+                <a:spcPts val="0"/>
+              </a:spcAft>
+              <a:buSzPct val="100000"/>
+              <a:defRPr/>
+            </a:pPr>
+            <a:r>
+              <a:rPr lang="en-US" dirty="0">
+                <a:latin typeface="Cordia New" panose="020B0304020202020204" pitchFamily="34" charset="-34"/>
+                <a:cs typeface="Cordia New" panose="020B0304020202020204" pitchFamily="34" charset="-34"/>
+              </a:rPr>
+              <a:t>TRIBITS_PACKAGE(HelloWorld)</a:t>
+            </a:r>
+          </a:p>
+          <a:p>
+            <a:pPr marL="0" lvl="1">
+              <a:spcAft>
+                <a:spcPts val="0"/>
+              </a:spcAft>
+              <a:buSzPct val="100000"/>
+              <a:defRPr/>
+            </a:pPr>
+            <a:r>
+              <a:rPr lang="en-US" dirty="0">
+                <a:latin typeface="Cordia New" panose="020B0304020202020204" pitchFamily="34" charset="-34"/>
+                <a:cs typeface="Cordia New" panose="020B0304020202020204" pitchFamily="34" charset="-34"/>
+              </a:rPr>
+              <a:t>TRIBITS_ADD_LIBRARY(hello_world_lib</a:t>
+            </a:r>
+          </a:p>
+          <a:p>
+            <a:pPr marL="0" lvl="1">
+              <a:spcAft>
+                <a:spcPts val="0"/>
+              </a:spcAft>
+              <a:buSzPct val="100000"/>
+              <a:defRPr/>
+            </a:pPr>
+            <a:r>
+              <a:rPr lang="en-US" dirty="0">
+                <a:latin typeface="Cordia New" panose="020B0304020202020204" pitchFamily="34" charset="-34"/>
+                <a:cs typeface="Cordia New" panose="020B0304020202020204" pitchFamily="34" charset="-34"/>
+              </a:rPr>
+              <a:t>  HEADERS hello_world_lib.hpp SOURCES hello_world_lib.cpp)</a:t>
+            </a:r>
+          </a:p>
+          <a:p>
+            <a:pPr marL="0" lvl="1">
+              <a:spcAft>
+                <a:spcPts val="0"/>
+              </a:spcAft>
+              <a:buSzPct val="100000"/>
+              <a:defRPr/>
+            </a:pPr>
+            <a:r>
+              <a:rPr lang="en-US" dirty="0">
+                <a:latin typeface="Cordia New" panose="020B0304020202020204" pitchFamily="34" charset="-34"/>
+                <a:cs typeface="Cordia New" panose="020B0304020202020204" pitchFamily="34" charset="-34"/>
+              </a:rPr>
+              <a:t>TRIBITS_ADD_EXECUTABLE(hello_world NOEXEPREFIX SOURCES hello_world_main.cpp</a:t>
+            </a:r>
+          </a:p>
+          <a:p>
+            <a:pPr marL="0" lvl="1">
+              <a:spcAft>
+                <a:spcPts val="0"/>
+              </a:spcAft>
+              <a:buSzPct val="100000"/>
+              <a:defRPr/>
+            </a:pPr>
+            <a:r>
+              <a:rPr lang="en-US" dirty="0">
+                <a:latin typeface="Cordia New" panose="020B0304020202020204" pitchFamily="34" charset="-34"/>
+                <a:cs typeface="Cordia New" panose="020B0304020202020204" pitchFamily="34" charset="-34"/>
+              </a:rPr>
+              <a:t>  INSTALLABLE)</a:t>
+            </a:r>
+          </a:p>
+          <a:p>
+            <a:pPr marL="0" lvl="1">
+              <a:spcAft>
+                <a:spcPts val="0"/>
+              </a:spcAft>
+              <a:buSzPct val="100000"/>
+              <a:defRPr/>
+            </a:pPr>
+            <a:r>
+              <a:rPr lang="en-US" dirty="0">
+                <a:latin typeface="Cordia New" panose="020B0304020202020204" pitchFamily="34" charset="-34"/>
+                <a:cs typeface="Cordia New" panose="020B0304020202020204" pitchFamily="34" charset="-34"/>
+              </a:rPr>
+              <a:t>TRIBITS_ADD_TEST(hello_world NOEXEPREFIX PASS_REGULAR_EXPRESSION "Hello World")</a:t>
+            </a:r>
+          </a:p>
+          <a:p>
+            <a:pPr marL="0" lvl="1">
+              <a:spcAft>
+                <a:spcPts val="0"/>
+              </a:spcAft>
+              <a:buSzPct val="100000"/>
+              <a:defRPr/>
+            </a:pPr>
+            <a:r>
+              <a:rPr lang="en-US" dirty="0">
+                <a:latin typeface="Cordia New" panose="020B0304020202020204" pitchFamily="34" charset="-34"/>
+                <a:cs typeface="Cordia New" panose="020B0304020202020204" pitchFamily="34" charset="-34"/>
+              </a:rPr>
+              <a:t>TRIBITS_ADD_EXECUTABLE_AND_TEST(unit_tests SOURCES hello_world_unit_tests.cpp</a:t>
+            </a:r>
+          </a:p>
+          <a:p>
+            <a:pPr marL="0" lvl="1">
+              <a:spcAft>
+                <a:spcPts val="0"/>
+              </a:spcAft>
+              <a:buSzPct val="100000"/>
+              <a:defRPr/>
+            </a:pPr>
+            <a:r>
+              <a:rPr lang="en-US" dirty="0">
+                <a:latin typeface="Cordia New" panose="020B0304020202020204" pitchFamily="34" charset="-34"/>
+                <a:cs typeface="Cordia New" panose="020B0304020202020204" pitchFamily="34" charset="-34"/>
+              </a:rPr>
+              <a:t>  PASS_REGULAR_EXPRESSION "All unit tests passed")</a:t>
+            </a:r>
+          </a:p>
+          <a:p>
+            <a:pPr marL="0" lvl="1">
+              <a:spcAft>
+                <a:spcPts val="0"/>
+              </a:spcAft>
+              <a:buSzPct val="100000"/>
+              <a:defRPr/>
+            </a:pPr>
+            <a:r>
+              <a:rPr lang="en-US" dirty="0">
+                <a:latin typeface="Cordia New" panose="020B0304020202020204" pitchFamily="34" charset="-34"/>
+                <a:cs typeface="Cordia New" panose="020B0304020202020204" pitchFamily="34" charset="-34"/>
+              </a:rPr>
+              <a:t>TRIBITS_PACKAGE_POSTPROCESS()</a:t>
+            </a:r>
+          </a:p>
+        </p:txBody>
+      </p:sp>
+    </p:spTree>
+    <p:extLst>
+      <p:ext uri="{BB962C8B-B14F-4D97-AF65-F5344CB8AC3E}">
+        <p14:creationId xmlns:p14="http://schemas.microsoft.com/office/powerpoint/2010/main" val="1683910939"/>
       </p:ext>
     </p:extLst>
   </p:cSld>
@@ -29628,355 +29316,96 @@
       </p:grpSpPr>
       <p:sp>
         <p:nvSpPr>
-          <p:cNvPr id="3075" name="Rectangle 2"/>
-          <p:cNvSpPr>
-            <a:spLocks noGrp="1" noChangeArrowheads="1"/>
-          </p:cNvSpPr>
-          <p:nvPr>
-            <p:ph type="title"/>
-          </p:nvPr>
-        </p:nvSpPr>
-        <p:spPr>
-          <a:xfrm>
-            <a:off x="424259" y="126170"/>
-            <a:ext cx="8526065" cy="381000"/>
-          </a:xfrm>
-        </p:spPr>
-        <p:txBody>
-          <a:bodyPr/>
-          <a:lstStyle/>
-          <a:p>
-            <a:r>
-              <a:rPr lang="en-US" altLang="en-US" dirty="0" smtClean="0"/>
-              <a:t>TriBITS Package CMakeList.txt File</a:t>
-            </a:r>
-          </a:p>
-        </p:txBody>
-      </p:sp>
-      <p:sp>
-        <p:nvSpPr>
-          <p:cNvPr id="5" name="Rectangle 3"/>
-          <p:cNvSpPr>
+          <p:cNvPr id="9" name="TextBox 231"/>
+          <p:cNvSpPr txBox="1">
             <a:spLocks noChangeArrowheads="1"/>
           </p:cNvSpPr>
           <p:nvPr/>
         </p:nvSpPr>
         <p:spPr bwMode="auto">
           <a:xfrm>
-            <a:off x="654690" y="3787904"/>
-            <a:ext cx="7988550" cy="2675091"/>
+            <a:off x="107993" y="2430470"/>
+            <a:ext cx="8803772" cy="1973284"/>
           </a:xfrm>
           <a:prstGeom prst="rect">
             <a:avLst/>
           </a:prstGeom>
           <a:noFill/>
-          <a:ln>
+          <a:ln w="9525">
             <a:noFill/>
-          </a:ln>
-          <a:extLst>
-            <a:ext uri="{909E8E84-426E-40DD-AFC4-6F175D3DCCD1}">
-              <a14:hiddenFill xmlns:a14="http://schemas.microsoft.com/office/drawing/2010/main">
-                <a:solidFill>
-                  <a:srgbClr val="FFFFFF"/>
-                </a:solidFill>
-              </a14:hiddenFill>
-            </a:ext>
-            <a:ext uri="{91240B29-F687-4F45-9708-019B960494DF}">
-              <a14:hiddenLine xmlns:a14="http://schemas.microsoft.com/office/drawing/2010/main" w="12700">
-                <a:solidFill>
-                  <a:srgbClr val="000000"/>
-                </a:solidFill>
-                <a:miter lim="800000"/>
-                <a:headEnd/>
-                <a:tailEnd/>
-              </a14:hiddenLine>
-            </a:ext>
-          </a:extLst>
-        </p:spPr>
-        <p:txBody>
-          <a:bodyPr wrap="square" lIns="90487" tIns="44450" rIns="90487" bIns="44450">
-            <a:spAutoFit/>
-          </a:bodyPr>
-          <a:lstStyle/>
-          <a:p>
-            <a:pPr lvl="1" indent="-285750">
-              <a:spcAft>
-                <a:spcPts val="0"/>
-              </a:spcAft>
-              <a:buSzPct val="100000"/>
-              <a:buFont typeface="Arial" pitchFamily="34" charset="0"/>
-              <a:buChar char="•"/>
-              <a:defRPr/>
-            </a:pPr>
-            <a:r>
-              <a:rPr lang="en-US" sz="2800" dirty="0" smtClean="0"/>
-              <a:t>Library linking automatically handled</a:t>
-            </a:r>
-          </a:p>
-          <a:p>
-            <a:pPr lvl="1" indent="-285750">
-              <a:spcAft>
-                <a:spcPts val="0"/>
-              </a:spcAft>
-              <a:buSzPct val="100000"/>
-              <a:buFont typeface="Arial" pitchFamily="34" charset="0"/>
-              <a:buChar char="•"/>
-              <a:defRPr/>
-            </a:pPr>
-            <a:r>
-              <a:rPr lang="en-US" sz="2800" dirty="0" smtClean="0"/>
-              <a:t>Avoid duplication and boiler-plate code</a:t>
-            </a:r>
-          </a:p>
-          <a:p>
-            <a:pPr lvl="1" indent="-285750">
-              <a:spcAft>
-                <a:spcPts val="0"/>
-              </a:spcAft>
-              <a:buSzPct val="100000"/>
-              <a:buFont typeface="Arial" pitchFamily="34" charset="0"/>
-              <a:buChar char="•"/>
-              <a:defRPr/>
-            </a:pPr>
-            <a:r>
-              <a:rPr lang="en-US" sz="2800" dirty="0" smtClean="0"/>
-              <a:t>Fewer commands</a:t>
-            </a:r>
-          </a:p>
-          <a:p>
-            <a:pPr lvl="1" indent="-285750">
-              <a:spcAft>
-                <a:spcPts val="0"/>
-              </a:spcAft>
-              <a:buSzPct val="100000"/>
-              <a:buFont typeface="Arial" pitchFamily="34" charset="0"/>
-              <a:buChar char="•"/>
-              <a:defRPr/>
-            </a:pPr>
-            <a:r>
-              <a:rPr lang="en-US" sz="2800" dirty="0" smtClean="0"/>
-              <a:t>Install by default (most common)</a:t>
-            </a:r>
-          </a:p>
-          <a:p>
-            <a:pPr lvl="1" indent="-285750">
-              <a:spcAft>
-                <a:spcPts val="0"/>
-              </a:spcAft>
-              <a:buSzPct val="100000"/>
-              <a:buFont typeface="Arial" pitchFamily="34" charset="0"/>
-              <a:buChar char="•"/>
-              <a:defRPr/>
-            </a:pPr>
-            <a:r>
-              <a:rPr lang="en-US" sz="2800" dirty="0" smtClean="0"/>
-              <a:t>Automatic namespacing of test &amp; exec names</a:t>
-            </a:r>
-          </a:p>
-          <a:p>
-            <a:pPr lvl="1" indent="-285750">
-              <a:spcAft>
-                <a:spcPts val="0"/>
-              </a:spcAft>
-              <a:buSzPct val="100000"/>
-              <a:buFont typeface="Arial" pitchFamily="34" charset="0"/>
-              <a:buChar char="•"/>
-              <a:defRPr/>
-            </a:pPr>
-            <a:endParaRPr lang="en-US" sz="2800" dirty="0"/>
-          </a:p>
-        </p:txBody>
-      </p:sp>
-      <p:sp>
-        <p:nvSpPr>
-          <p:cNvPr id="4" name="Rectangle 3"/>
-          <p:cNvSpPr>
-            <a:spLocks noChangeArrowheads="1"/>
-          </p:cNvSpPr>
-          <p:nvPr/>
-        </p:nvSpPr>
-        <p:spPr bwMode="auto">
-          <a:xfrm>
-            <a:off x="923525" y="866206"/>
-            <a:ext cx="6682625" cy="2582758"/>
-          </a:xfrm>
-          <a:prstGeom prst="rect">
-            <a:avLst/>
-          </a:prstGeom>
-          <a:noFill/>
-          <a:ln w="12700">
-            <a:solidFill>
-              <a:srgbClr val="000000"/>
-            </a:solidFill>
             <a:miter lim="800000"/>
             <a:headEnd/>
             <a:tailEnd/>
           </a:ln>
-          <a:extLst>
-            <a:ext uri="{909E8E84-426E-40DD-AFC4-6F175D3DCCD1}">
-              <a14:hiddenFill xmlns:a14="http://schemas.microsoft.com/office/drawing/2010/main">
-                <a:solidFill>
-                  <a:srgbClr val="FFFFFF"/>
-                </a:solidFill>
-              </a14:hiddenFill>
-            </a:ext>
-          </a:extLst>
+          <a:effectLst>
+            <a:outerShdw blurRad="50800" dist="38100" dir="2700000" algn="tl" rotWithShape="0">
+              <a:prstClr val="black">
+                <a:alpha val="40000"/>
+              </a:prstClr>
+            </a:outerShdw>
+          </a:effectLst>
         </p:spPr>
         <p:txBody>
-          <a:bodyPr wrap="square" lIns="90487" tIns="44450" rIns="90487" bIns="44450">
+          <a:bodyPr wrap="square" lIns="125401" tIns="62700" rIns="125401" bIns="62700">
             <a:spAutoFit/>
           </a:bodyPr>
           <a:lstStyle/>
           <a:p>
-            <a:pPr marL="0" lvl="1">
-              <a:spcAft>
-                <a:spcPts val="0"/>
-              </a:spcAft>
-              <a:buSzPct val="100000"/>
-              <a:defRPr/>
-            </a:pPr>
-            <a:r>
-              <a:rPr lang="en-US" dirty="0">
-                <a:latin typeface="Cordia New" panose="020B0304020202020204" pitchFamily="34" charset="-34"/>
-                <a:cs typeface="Cordia New" panose="020B0304020202020204" pitchFamily="34" charset="-34"/>
+            <a:pPr algn="ctr"/>
+            <a:r>
+              <a:rPr lang="en-US" sz="4000" b="1" dirty="0" smtClean="0">
+                <a:solidFill>
+                  <a:schemeClr val="accent1">
+                    <a:lumMod val="75000"/>
+                  </a:schemeClr>
+                </a:solidFill>
+                <a:latin typeface="+mj-lt"/>
               </a:rPr>
-              <a:t>TRIBITS_PACKAGE(HelloWorld)</a:t>
-            </a:r>
-          </a:p>
-          <a:p>
-            <a:pPr marL="0" lvl="1">
-              <a:spcAft>
-                <a:spcPts val="0"/>
-              </a:spcAft>
-              <a:buSzPct val="100000"/>
-              <a:defRPr/>
-            </a:pPr>
-            <a:r>
-              <a:rPr lang="en-US" dirty="0">
-                <a:latin typeface="Cordia New" panose="020B0304020202020204" pitchFamily="34" charset="-34"/>
-                <a:cs typeface="Cordia New" panose="020B0304020202020204" pitchFamily="34" charset="-34"/>
+              <a:t>TriBITS Structural Units</a:t>
+            </a:r>
+          </a:p>
+          <a:p>
+            <a:pPr algn="ctr"/>
+            <a:r>
+              <a:rPr lang="en-US" sz="4000" b="1" dirty="0" smtClean="0">
+                <a:solidFill>
+                  <a:schemeClr val="accent1">
+                    <a:lumMod val="75000"/>
+                  </a:schemeClr>
+                </a:solidFill>
+                <a:latin typeface="+mj-lt"/>
               </a:rPr>
-              <a:t>TRIBITS_ADD_LIBRARY(hello_world_lib</a:t>
-            </a:r>
-          </a:p>
-          <a:p>
-            <a:pPr marL="0" lvl="1">
-              <a:spcAft>
-                <a:spcPts val="0"/>
-              </a:spcAft>
-              <a:buSzPct val="100000"/>
-              <a:defRPr/>
-            </a:pPr>
-            <a:r>
-              <a:rPr lang="en-US" dirty="0">
-                <a:latin typeface="Cordia New" panose="020B0304020202020204" pitchFamily="34" charset="-34"/>
-                <a:cs typeface="Cordia New" panose="020B0304020202020204" pitchFamily="34" charset="-34"/>
+              <a:t>and</a:t>
+            </a:r>
+          </a:p>
+          <a:p>
+            <a:pPr algn="ctr"/>
+            <a:r>
+              <a:rPr lang="en-US" sz="4000" b="1" dirty="0" smtClean="0">
+                <a:solidFill>
+                  <a:schemeClr val="accent1">
+                    <a:lumMod val="75000"/>
+                  </a:schemeClr>
+                </a:solidFill>
+                <a:latin typeface="+mj-lt"/>
               </a:rPr>
-              <a:t>  HEADERS hello_world_lib.hpp SOURCES hello_world_lib.cpp)</a:t>
-            </a:r>
-          </a:p>
-          <a:p>
-            <a:pPr marL="0" lvl="1">
-              <a:spcAft>
-                <a:spcPts val="0"/>
-              </a:spcAft>
-              <a:buSzPct val="100000"/>
-              <a:defRPr/>
-            </a:pPr>
-            <a:r>
-              <a:rPr lang="en-US" dirty="0">
-                <a:latin typeface="Cordia New" panose="020B0304020202020204" pitchFamily="34" charset="-34"/>
-                <a:cs typeface="Cordia New" panose="020B0304020202020204" pitchFamily="34" charset="-34"/>
-              </a:rPr>
-              <a:t>TRIBITS_ADD_EXECUTABLE(hello_world NOEXEPREFIX SOURCES hello_world_main.cpp</a:t>
-            </a:r>
-          </a:p>
-          <a:p>
-            <a:pPr marL="0" lvl="1">
-              <a:spcAft>
-                <a:spcPts val="0"/>
-              </a:spcAft>
-              <a:buSzPct val="100000"/>
-              <a:defRPr/>
-            </a:pPr>
-            <a:r>
-              <a:rPr lang="en-US" dirty="0">
-                <a:latin typeface="Cordia New" panose="020B0304020202020204" pitchFamily="34" charset="-34"/>
-                <a:cs typeface="Cordia New" panose="020B0304020202020204" pitchFamily="34" charset="-34"/>
-              </a:rPr>
-              <a:t>  INSTALLABLE)</a:t>
-            </a:r>
-          </a:p>
-          <a:p>
-            <a:pPr marL="0" lvl="1">
-              <a:spcAft>
-                <a:spcPts val="0"/>
-              </a:spcAft>
-              <a:buSzPct val="100000"/>
-              <a:defRPr/>
-            </a:pPr>
-            <a:r>
-              <a:rPr lang="en-US" dirty="0">
-                <a:latin typeface="Cordia New" panose="020B0304020202020204" pitchFamily="34" charset="-34"/>
-                <a:cs typeface="Cordia New" panose="020B0304020202020204" pitchFamily="34" charset="-34"/>
-              </a:rPr>
-              <a:t>TRIBITS_ADD_TEST(hello_world NOEXEPREFIX PASS_REGULAR_EXPRESSION "Hello World")</a:t>
-            </a:r>
-          </a:p>
-          <a:p>
-            <a:pPr marL="0" lvl="1">
-              <a:spcAft>
-                <a:spcPts val="0"/>
-              </a:spcAft>
-              <a:buSzPct val="100000"/>
-              <a:defRPr/>
-            </a:pPr>
-            <a:r>
-              <a:rPr lang="en-US" dirty="0">
-                <a:latin typeface="Cordia New" panose="020B0304020202020204" pitchFamily="34" charset="-34"/>
-                <a:cs typeface="Cordia New" panose="020B0304020202020204" pitchFamily="34" charset="-34"/>
-              </a:rPr>
-              <a:t>TRIBITS_ADD_EXECUTABLE_AND_TEST(unit_tests SOURCES hello_world_unit_tests.cpp</a:t>
-            </a:r>
-          </a:p>
-          <a:p>
-            <a:pPr marL="0" lvl="1">
-              <a:spcAft>
-                <a:spcPts val="0"/>
-              </a:spcAft>
-              <a:buSzPct val="100000"/>
-              <a:defRPr/>
-            </a:pPr>
-            <a:r>
-              <a:rPr lang="en-US" dirty="0">
-                <a:latin typeface="Cordia New" panose="020B0304020202020204" pitchFamily="34" charset="-34"/>
-                <a:cs typeface="Cordia New" panose="020B0304020202020204" pitchFamily="34" charset="-34"/>
-              </a:rPr>
-              <a:t>  PASS_REGULAR_EXPRESSION "All unit tests passed")</a:t>
-            </a:r>
-          </a:p>
-          <a:p>
-            <a:pPr marL="0" lvl="1">
-              <a:spcAft>
-                <a:spcPts val="0"/>
-              </a:spcAft>
-              <a:buSzPct val="100000"/>
-              <a:defRPr/>
-            </a:pPr>
-            <a:r>
-              <a:rPr lang="en-US" dirty="0">
-                <a:latin typeface="Cordia New" panose="020B0304020202020204" pitchFamily="34" charset="-34"/>
-                <a:cs typeface="Cordia New" panose="020B0304020202020204" pitchFamily="34" charset="-34"/>
-              </a:rPr>
-              <a:t>TRIBITS_PACKAGE_POSTPROCESS()</a:t>
-            </a:r>
+              <a:t>Meta-Projects</a:t>
+            </a:r>
+            <a:endParaRPr lang="en-US" sz="4000" b="1" dirty="0">
+              <a:solidFill>
+                <a:schemeClr val="accent1">
+                  <a:lumMod val="75000"/>
+                </a:schemeClr>
+              </a:solidFill>
+              <a:latin typeface="+mj-lt"/>
+            </a:endParaRPr>
           </a:p>
         </p:txBody>
       </p:sp>
     </p:spTree>
     <p:extLst>
       <p:ext uri="{BB962C8B-B14F-4D97-AF65-F5344CB8AC3E}">
-        <p14:creationId xmlns:p14="http://schemas.microsoft.com/office/powerpoint/2010/main" val="1683910939"/>
+        <p14:creationId xmlns:p14="http://schemas.microsoft.com/office/powerpoint/2010/main" val="997390504"/>
       </p:ext>
     </p:extLst>
   </p:cSld>

</xml_diff>